<commit_message>
Updated DocDB presentation to reference scenario for context.
</commit_message>
<xml_diff>
--- a/Presentations/AI Immersion - Phase 1 - DocumentDB.pptx
+++ b/Presentations/AI Immersion - Phase 1 - DocumentDB.pptx
@@ -5,27 +5,28 @@
     <p:sldMasterId id="2147484229" r:id="rId4"/>
   </p:sldMasterIdLst>
   <p:notesMasterIdLst>
-    <p:notesMasterId r:id="rId20"/>
+    <p:notesMasterId r:id="rId21"/>
   </p:notesMasterIdLst>
   <p:handoutMasterIdLst>
-    <p:handoutMasterId r:id="rId21"/>
+    <p:handoutMasterId r:id="rId22"/>
   </p:handoutMasterIdLst>
   <p:sldIdLst>
     <p:sldId id="1485" r:id="rId5"/>
     <p:sldId id="1519" r:id="rId6"/>
-    <p:sldId id="1534" r:id="rId7"/>
-    <p:sldId id="1536" r:id="rId8"/>
-    <p:sldId id="1539" r:id="rId9"/>
-    <p:sldId id="1537" r:id="rId10"/>
-    <p:sldId id="1545" r:id="rId11"/>
-    <p:sldId id="1540" r:id="rId12"/>
-    <p:sldId id="1541" r:id="rId13"/>
-    <p:sldId id="1542" r:id="rId14"/>
-    <p:sldId id="1543" r:id="rId15"/>
-    <p:sldId id="1527" r:id="rId16"/>
-    <p:sldId id="1530" r:id="rId17"/>
-    <p:sldId id="1546" r:id="rId18"/>
-    <p:sldId id="1532" r:id="rId19"/>
+    <p:sldId id="1547" r:id="rId7"/>
+    <p:sldId id="1534" r:id="rId8"/>
+    <p:sldId id="1536" r:id="rId9"/>
+    <p:sldId id="1539" r:id="rId10"/>
+    <p:sldId id="1537" r:id="rId11"/>
+    <p:sldId id="1545" r:id="rId12"/>
+    <p:sldId id="1540" r:id="rId13"/>
+    <p:sldId id="1541" r:id="rId14"/>
+    <p:sldId id="1542" r:id="rId15"/>
+    <p:sldId id="1543" r:id="rId16"/>
+    <p:sldId id="1527" r:id="rId17"/>
+    <p:sldId id="1530" r:id="rId18"/>
+    <p:sldId id="1546" r:id="rId19"/>
+    <p:sldId id="1532" r:id="rId20"/>
   </p:sldIdLst>
   <p:sldSz cx="12436475" cy="6994525"/>
   <p:notesSz cx="6858000" cy="9144000"/>
@@ -131,6 +132,7 @@
           <p14:sldIdLst>
             <p14:sldId id="1485"/>
             <p14:sldId id="1519"/>
+            <p14:sldId id="1547"/>
             <p14:sldId id="1534"/>
             <p14:sldId id="1536"/>
             <p14:sldId id="1539"/>
@@ -283,7 +285,7 @@
               <a:rPr lang="en-US" smtClean="0">
                 <a:latin typeface="Segoe UI" pitchFamily="34" charset="0"/>
               </a:rPr>
-              <a:t>5/7/2017 10:52 AM</a:t>
+              <a:t>5/7/2017 9:21 PM</a:t>
             </a:fld>
             <a:endParaRPr lang="en-US" dirty="0">
               <a:latin typeface="Segoe UI" pitchFamily="34" charset="0"/>
@@ -580,7 +582,7 @@
           <a:p>
             <a:fld id="{D18B56EA-E28F-4F92-9F16-7A6F2501B303}" type="datetime8">
               <a:rPr lang="en-US" smtClean="0"/>
-              <a:t>5/7/2017 10:41 AM</a:t>
+              <a:t>5/7/2017 5:31 PM</a:t>
             </a:fld>
             <a:endParaRPr lang="en-US" dirty="0"/>
           </a:p>
@@ -966,7 +968,7 @@
           <a:p>
             <a:fld id="{88B44C4B-E218-4158-810E-47EF8FD635FD}" type="datetime8">
               <a:rPr lang="en-US" smtClean="0"/>
-              <a:t>5/7/2017 10:41 AM</a:t>
+              <a:t>5/7/2017 5:31 PM</a:t>
             </a:fld>
             <a:endParaRPr lang="en-US" dirty="0"/>
           </a:p>
@@ -1119,7 +1121,7 @@
                   <a:prstClr val="black"/>
                 </a:solidFill>
               </a:rPr>
-              <a:t>5/7/2017 10:41 AM</a:t>
+              <a:t>5/7/2017 5:31 PM</a:t>
             </a:fld>
             <a:endParaRPr lang="en-US" dirty="0">
               <a:solidFill>
@@ -1151,7 +1153,7 @@
                 </a:solidFill>
               </a:rPr>
               <a:pPr/>
-              <a:t>15</a:t>
+              <a:t>16</a:t>
             </a:fld>
             <a:endParaRPr lang="en-US" dirty="0">
               <a:solidFill>
@@ -1353,7 +1355,7 @@
           <a:p>
             <a:fld id="{8683C9CD-37C6-4B53-B210-CC8F66F90493}" type="datetime8">
               <a:rPr lang="en-US" smtClean="0"/>
-              <a:t>5/7/2017 10:41 AM</a:t>
+              <a:t>5/7/2017 5:31 PM</a:t>
             </a:fld>
             <a:endParaRPr lang="en-US" dirty="0"/>
           </a:p>
@@ -1534,7 +1536,7 @@
           <a:p>
             <a:fld id="{38EEC551-8CDA-4EB6-89BB-2A86C9F091C8}" type="datetime8">
               <a:rPr lang="en-US" smtClean="0"/>
-              <a:t>5/7/2017 10:41 AM</a:t>
+              <a:t>5/7/2017 5:31 PM</a:t>
             </a:fld>
             <a:endParaRPr lang="en-US" dirty="0"/>
           </a:p>
@@ -1558,7 +1560,7 @@
             <a:fld id="{B4008EB6-D09E-4580-8CD6-DDB14511944F}" type="slidenum">
               <a:rPr lang="en-US" smtClean="0"/>
               <a:pPr/>
-              <a:t>7</a:t>
+              <a:t>8</a:t>
             </a:fld>
             <a:endParaRPr lang="en-US" dirty="0"/>
           </a:p>
@@ -1854,7 +1856,7 @@
                 <a:tabLst/>
                 <a:defRPr/>
               </a:pPr>
-              <a:t>9</a:t>
+              <a:t>10</a:t>
             </a:fld>
             <a:endParaRPr kumimoji="0" lang="en-US" sz="1800" b="0" i="0" u="none" strike="noStrike" kern="0" cap="none" spc="0" normalizeH="0" baseline="0" noProof="0" dirty="0">
               <a:ln>
@@ -2108,7 +2110,7 @@
             <a:fld id="{D3165507-753C-4AA4-A945-975B3E06CA67}" type="slidenum">
               <a:rPr lang="en-US" smtClean="0"/>
               <a:pPr/>
-              <a:t>10</a:t>
+              <a:t>11</a:t>
             </a:fld>
             <a:endParaRPr lang="en-US"/>
           </a:p>
@@ -2195,7 +2197,7 @@
             <a:fld id="{D3165507-753C-4AA4-A945-975B3E06CA67}" type="slidenum">
               <a:rPr lang="en-US" smtClean="0"/>
               <a:pPr/>
-              <a:t>11</a:t>
+              <a:t>12</a:t>
             </a:fld>
             <a:endParaRPr lang="en-US"/>
           </a:p>
@@ -2355,7 +2357,7 @@
           <a:p>
             <a:fld id="{627F603A-779F-4101-9B83-C34650C566A7}" type="datetime8">
               <a:rPr lang="en-US" smtClean="0"/>
-              <a:t>5/7/2017 10:41 AM</a:t>
+              <a:t>5/7/2017 5:31 PM</a:t>
             </a:fld>
             <a:endParaRPr lang="en-US" dirty="0"/>
           </a:p>
@@ -2379,7 +2381,7 @@
             <a:fld id="{B4008EB6-D09E-4580-8CD6-DDB14511944F}" type="slidenum">
               <a:rPr lang="en-US" smtClean="0"/>
               <a:pPr/>
-              <a:t>12</a:t>
+              <a:t>13</a:t>
             </a:fld>
             <a:endParaRPr lang="en-US" dirty="0"/>
           </a:p>
@@ -2464,7 +2466,7 @@
             <a:fld id="{B4008EB6-D09E-4580-8CD6-DDB14511944F}" type="slidenum">
               <a:rPr lang="en-US" smtClean="0"/>
               <a:pPr/>
-              <a:t>13</a:t>
+              <a:t>14</a:t>
             </a:fld>
             <a:endParaRPr lang="en-US" dirty="0"/>
           </a:p>
@@ -2487,7 +2489,7 @@
           <a:p>
             <a:fld id="{E45DD59A-D9AD-4C82-9DE1-A42A8DB4D1E1}" type="datetime8">
               <a:rPr lang="en-US" smtClean="0"/>
-              <a:t>5/7/2017 10:41 AM</a:t>
+              <a:t>5/7/2017 5:31 PM</a:t>
             </a:fld>
             <a:endParaRPr lang="en-US" dirty="0"/>
           </a:p>
@@ -2648,7 +2650,7 @@
             <a:fld id="{B4008EB6-D09E-4580-8CD6-DDB14511944F}" type="slidenum">
               <a:rPr lang="en-US" smtClean="0"/>
               <a:pPr/>
-              <a:t>14</a:t>
+              <a:t>15</a:t>
             </a:fld>
             <a:endParaRPr lang="en-US" dirty="0"/>
           </a:p>
@@ -2671,7 +2673,7 @@
           <a:p>
             <a:fld id="{E45DD59A-D9AD-4C82-9DE1-A42A8DB4D1E1}" type="datetime8">
               <a:rPr lang="en-US" smtClean="0"/>
-              <a:t>5/7/2017 10:41 AM</a:t>
+              <a:t>5/7/2017 5:31 PM</a:t>
             </a:fld>
             <a:endParaRPr lang="en-US" dirty="0"/>
           </a:p>
@@ -9693,6 +9695,900 @@
 </file>
 
 <file path=ppt/slides/slide10.xml><?xml version="1.0" encoding="utf-8"?>
+<p:sld xmlns:a="http://schemas.openxmlformats.org/drawingml/2006/main" xmlns:r="http://schemas.openxmlformats.org/officeDocument/2006/relationships" xmlns:p="http://schemas.openxmlformats.org/presentationml/2006/main">
+  <p:cSld>
+    <p:spTree>
+      <p:nvGrpSpPr>
+        <p:cNvPr id="1" name=""/>
+        <p:cNvGrpSpPr/>
+        <p:nvPr/>
+      </p:nvGrpSpPr>
+      <p:grpSpPr>
+        <a:xfrm>
+          <a:off x="0" y="0"/>
+          <a:ext cx="0" cy="0"/>
+          <a:chOff x="0" y="0"/>
+          <a:chExt cx="0" cy="0"/>
+        </a:xfrm>
+      </p:grpSpPr>
+      <p:sp>
+        <p:nvSpPr>
+          <p:cNvPr id="4" name="Rectangle 3"/>
+          <p:cNvSpPr/>
+          <p:nvPr/>
+        </p:nvSpPr>
+        <p:spPr bwMode="auto">
+          <a:xfrm>
+            <a:off x="660524" y="1592804"/>
+            <a:ext cx="3047135" cy="4926172"/>
+          </a:xfrm>
+          <a:prstGeom prst="rect">
+            <a:avLst/>
+          </a:prstGeom>
+          <a:noFill/>
+          <a:ln w="28575">
+            <a:solidFill>
+              <a:schemeClr val="tx1"/>
+            </a:solidFill>
+            <a:headEnd type="none" w="med" len="med"/>
+            <a:tailEnd type="none" w="med" len="med"/>
+          </a:ln>
+        </p:spPr>
+        <p:style>
+          <a:lnRef idx="2">
+            <a:schemeClr val="accent1">
+              <a:shade val="50000"/>
+            </a:schemeClr>
+          </a:lnRef>
+          <a:fillRef idx="1">
+            <a:schemeClr val="accent1"/>
+          </a:fillRef>
+          <a:effectRef idx="0">
+            <a:schemeClr val="accent1"/>
+          </a:effectRef>
+          <a:fontRef idx="minor">
+            <a:schemeClr val="lt1"/>
+          </a:fontRef>
+        </p:style>
+        <p:txBody>
+          <a:bodyPr vert="horz" wrap="square" lIns="0" tIns="46623" rIns="0" bIns="46623" numCol="1" rtlCol="0" anchor="ctr" anchorCtr="0" compatLnSpc="1">
+            <a:prstTxWarp prst="textNoShape">
+              <a:avLst/>
+            </a:prstTxWarp>
+          </a:bodyPr>
+          <a:lstStyle/>
+          <a:p>
+            <a:pPr algn="ctr" defTabSz="932137" fontAlgn="base">
+              <a:spcBef>
+                <a:spcPct val="0"/>
+              </a:spcBef>
+              <a:spcAft>
+                <a:spcPct val="0"/>
+              </a:spcAft>
+            </a:pPr>
+            <a:endParaRPr lang="en-US" sz="2000" kern="0" dirty="0">
+              <a:solidFill>
+                <a:schemeClr val="tx1"/>
+              </a:solidFill>
+              <a:latin typeface="Segoe UI"/>
+            </a:endParaRPr>
+          </a:p>
+        </p:txBody>
+      </p:sp>
+      <p:sp>
+        <p:nvSpPr>
+          <p:cNvPr id="13" name="TextBox 12"/>
+          <p:cNvSpPr txBox="1"/>
+          <p:nvPr/>
+        </p:nvSpPr>
+        <p:spPr>
+          <a:xfrm>
+            <a:off x="660524" y="1592803"/>
+            <a:ext cx="3047135" cy="544808"/>
+          </a:xfrm>
+          <a:prstGeom prst="rect">
+            <a:avLst/>
+          </a:prstGeom>
+          <a:noFill/>
+          <a:ln w="28575">
+            <a:solidFill>
+              <a:schemeClr val="tx1"/>
+            </a:solidFill>
+          </a:ln>
+        </p:spPr>
+        <p:txBody>
+          <a:bodyPr wrap="square" lIns="182827" tIns="146262" rIns="182827" bIns="146262" rtlCol="0">
+            <a:spAutoFit/>
+          </a:bodyPr>
+          <a:lstStyle/>
+          <a:p>
+            <a:pPr defTabSz="914072">
+              <a:lnSpc>
+                <a:spcPct val="90000"/>
+              </a:lnSpc>
+              <a:spcAft>
+                <a:spcPts val="600"/>
+              </a:spcAft>
+            </a:pPr>
+            <a:r>
+              <a:rPr lang="en-US" sz="1801" b="1" kern="0" dirty="0">
+                <a:latin typeface="Segoe UI"/>
+              </a:rPr>
+              <a:t>Person</a:t>
+            </a:r>
+          </a:p>
+        </p:txBody>
+      </p:sp>
+      <p:cxnSp>
+        <p:nvCxnSpPr>
+          <p:cNvPr id="34" name="Straight Connector 33"/>
+          <p:cNvCxnSpPr/>
+          <p:nvPr/>
+        </p:nvCxnSpPr>
+        <p:spPr>
+          <a:xfrm>
+            <a:off x="673221" y="2506943"/>
+            <a:ext cx="3034438" cy="0"/>
+          </a:xfrm>
+          <a:prstGeom prst="line">
+            <a:avLst/>
+          </a:prstGeom>
+          <a:ln>
+            <a:solidFill>
+              <a:schemeClr val="tx1"/>
+            </a:solidFill>
+            <a:prstDash val="dashDot"/>
+            <a:headEnd type="none"/>
+            <a:tailEnd type="none"/>
+          </a:ln>
+        </p:spPr>
+        <p:style>
+          <a:lnRef idx="1">
+            <a:schemeClr val="accent1"/>
+          </a:lnRef>
+          <a:fillRef idx="0">
+            <a:schemeClr val="accent1"/>
+          </a:fillRef>
+          <a:effectRef idx="0">
+            <a:schemeClr val="accent1"/>
+          </a:effectRef>
+          <a:fontRef idx="minor">
+            <a:schemeClr val="tx1"/>
+          </a:fontRef>
+        </p:style>
+      </p:cxnSp>
+      <p:sp>
+        <p:nvSpPr>
+          <p:cNvPr id="38" name="TextBox 37"/>
+          <p:cNvSpPr txBox="1"/>
+          <p:nvPr/>
+        </p:nvSpPr>
+        <p:spPr>
+          <a:xfrm>
+            <a:off x="789610" y="2080182"/>
+            <a:ext cx="617691" cy="516723"/>
+          </a:xfrm>
+          <a:prstGeom prst="rect">
+            <a:avLst/>
+          </a:prstGeom>
+          <a:noFill/>
+        </p:spPr>
+        <p:txBody>
+          <a:bodyPr wrap="none" lIns="182827" tIns="146262" rIns="182827" bIns="146262" rtlCol="0">
+            <a:spAutoFit/>
+          </a:bodyPr>
+          <a:lstStyle/>
+          <a:p>
+            <a:pPr defTabSz="914072">
+              <a:lnSpc>
+                <a:spcPct val="90000"/>
+              </a:lnSpc>
+              <a:spcAft>
+                <a:spcPts val="600"/>
+              </a:spcAft>
+            </a:pPr>
+            <a:r>
+              <a:rPr lang="en-US" sz="1598" b="1" kern="0" dirty="0">
+                <a:latin typeface="Segoe UI"/>
+              </a:rPr>
+              <a:t> Id</a:t>
+            </a:r>
+          </a:p>
+        </p:txBody>
+      </p:sp>
+      <p:pic>
+        <p:nvPicPr>
+          <p:cNvPr id="45" name="Picture 44" descr="Key, Yellow, Metal, Symbol, Icon"/>
+          <p:cNvPicPr>
+            <a:picLocks noChangeAspect="1"/>
+          </p:cNvPicPr>
+          <p:nvPr/>
+        </p:nvPicPr>
+        <p:blipFill>
+          <a:blip r:embed="rId3"/>
+          <a:stretch>
+            <a:fillRect/>
+          </a:stretch>
+        </p:blipFill>
+        <p:spPr>
+          <a:xfrm rot="5400000">
+            <a:off x="770141" y="2272254"/>
+            <a:ext cx="281184" cy="140592"/>
+          </a:xfrm>
+          <a:prstGeom prst="rect">
+            <a:avLst/>
+          </a:prstGeom>
+        </p:spPr>
+      </p:pic>
+      <p:sp>
+        <p:nvSpPr>
+          <p:cNvPr id="32" name="TextBox 31"/>
+          <p:cNvSpPr txBox="1"/>
+          <p:nvPr/>
+        </p:nvSpPr>
+        <p:spPr>
+          <a:xfrm>
+            <a:off x="660524" y="2506943"/>
+            <a:ext cx="3047135" cy="2503036"/>
+          </a:xfrm>
+          <a:prstGeom prst="rect">
+            <a:avLst/>
+          </a:prstGeom>
+          <a:noFill/>
+          <a:ln w="28575">
+            <a:solidFill>
+              <a:schemeClr val="tx1"/>
+            </a:solidFill>
+          </a:ln>
+        </p:spPr>
+        <p:txBody>
+          <a:bodyPr wrap="square" lIns="182827" tIns="146262" rIns="182827" bIns="146262" rtlCol="0">
+            <a:spAutoFit/>
+          </a:bodyPr>
+          <a:lstStyle/>
+          <a:p>
+            <a:pPr defTabSz="914072">
+              <a:lnSpc>
+                <a:spcPct val="90000"/>
+              </a:lnSpc>
+              <a:spcAft>
+                <a:spcPts val="600"/>
+              </a:spcAft>
+            </a:pPr>
+            <a:r>
+              <a:rPr lang="en-US" sz="1801" b="1" kern="0" dirty="0">
+                <a:latin typeface="Segoe UI"/>
+              </a:rPr>
+              <a:t>Addresses</a:t>
+            </a:r>
+          </a:p>
+          <a:p>
+            <a:pPr defTabSz="914072">
+              <a:lnSpc>
+                <a:spcPct val="90000"/>
+              </a:lnSpc>
+              <a:spcAft>
+                <a:spcPts val="600"/>
+              </a:spcAft>
+            </a:pPr>
+            <a:endParaRPr lang="en-US" sz="1801" b="1" kern="0" dirty="0">
+              <a:latin typeface="Segoe UI"/>
+            </a:endParaRPr>
+          </a:p>
+          <a:p>
+            <a:pPr defTabSz="914072">
+              <a:lnSpc>
+                <a:spcPct val="90000"/>
+              </a:lnSpc>
+              <a:spcAft>
+                <a:spcPts val="600"/>
+              </a:spcAft>
+            </a:pPr>
+            <a:endParaRPr lang="en-US" sz="1801" b="1" kern="0" dirty="0">
+              <a:latin typeface="Segoe UI"/>
+            </a:endParaRPr>
+          </a:p>
+          <a:p>
+            <a:pPr defTabSz="914072">
+              <a:lnSpc>
+                <a:spcPct val="90000"/>
+              </a:lnSpc>
+              <a:spcAft>
+                <a:spcPts val="600"/>
+              </a:spcAft>
+            </a:pPr>
+            <a:endParaRPr lang="en-US" sz="1801" b="1" kern="0" dirty="0">
+              <a:latin typeface="Segoe UI"/>
+            </a:endParaRPr>
+          </a:p>
+          <a:p>
+            <a:pPr defTabSz="914072">
+              <a:lnSpc>
+                <a:spcPct val="90000"/>
+              </a:lnSpc>
+              <a:spcAft>
+                <a:spcPts val="600"/>
+              </a:spcAft>
+            </a:pPr>
+            <a:endParaRPr lang="en-US" sz="1801" b="1" kern="0" dirty="0">
+              <a:latin typeface="Segoe UI"/>
+            </a:endParaRPr>
+          </a:p>
+          <a:p>
+            <a:pPr defTabSz="914072">
+              <a:lnSpc>
+                <a:spcPct val="90000"/>
+              </a:lnSpc>
+              <a:spcAft>
+                <a:spcPts val="600"/>
+              </a:spcAft>
+            </a:pPr>
+            <a:endParaRPr lang="en-US" sz="1801" b="1" kern="0" dirty="0">
+              <a:latin typeface="Segoe UI"/>
+            </a:endParaRPr>
+          </a:p>
+          <a:p>
+            <a:pPr defTabSz="914072">
+              <a:lnSpc>
+                <a:spcPct val="90000"/>
+              </a:lnSpc>
+              <a:spcAft>
+                <a:spcPts val="600"/>
+              </a:spcAft>
+            </a:pPr>
+            <a:endParaRPr lang="en-US" sz="1801" b="1" kern="0" dirty="0">
+              <a:latin typeface="Segoe UI"/>
+            </a:endParaRPr>
+          </a:p>
+        </p:txBody>
+      </p:sp>
+      <p:sp>
+        <p:nvSpPr>
+          <p:cNvPr id="2" name="TextBox 1"/>
+          <p:cNvSpPr txBox="1"/>
+          <p:nvPr/>
+        </p:nvSpPr>
+        <p:spPr>
+          <a:xfrm>
+            <a:off x="3932888" y="1409386"/>
+            <a:ext cx="8550952" cy="5462949"/>
+          </a:xfrm>
+          <a:prstGeom prst="rect">
+            <a:avLst/>
+          </a:prstGeom>
+          <a:noFill/>
+        </p:spPr>
+        <p:txBody>
+          <a:bodyPr wrap="none" lIns="182827" tIns="146262" rIns="182827" bIns="146262" rtlCol="0">
+            <a:spAutoFit/>
+          </a:bodyPr>
+          <a:lstStyle/>
+          <a:p>
+            <a:pPr defTabSz="914072">
+              <a:lnSpc>
+                <a:spcPct val="90000"/>
+              </a:lnSpc>
+              <a:spcAft>
+                <a:spcPts val="600"/>
+              </a:spcAft>
+            </a:pPr>
+            <a:r>
+              <a:rPr lang="en-US" sz="2400" b="1" kern="0" dirty="0">
+                <a:latin typeface="Lucida Console" panose="020B0609040504020204" pitchFamily="49" charset="0"/>
+              </a:rPr>
+              <a:t>{</a:t>
+            </a:r>
+            <a:br>
+              <a:rPr lang="en-US" sz="2400" b="1" kern="0" dirty="0">
+                <a:latin typeface="Lucida Console" panose="020B0609040504020204" pitchFamily="49" charset="0"/>
+              </a:rPr>
+            </a:br>
+            <a:r>
+              <a:rPr lang="en-US" sz="2400" b="1" kern="0" dirty="0">
+                <a:latin typeface="Lucida Console" panose="020B0609040504020204" pitchFamily="49" charset="0"/>
+              </a:rPr>
+              <a:t>  "id": "0ec1ab0c-de08-4e42-a429-...",</a:t>
+            </a:r>
+          </a:p>
+          <a:p>
+            <a:pPr defTabSz="914072">
+              <a:lnSpc>
+                <a:spcPct val="90000"/>
+              </a:lnSpc>
+              <a:spcAft>
+                <a:spcPts val="600"/>
+              </a:spcAft>
+            </a:pPr>
+            <a:r>
+              <a:rPr lang="en-US" sz="2400" b="1" kern="0" dirty="0">
+                <a:latin typeface="Lucida Console" panose="020B0609040504020204" pitchFamily="49" charset="0"/>
+              </a:rPr>
+              <a:t>  "addresses": [</a:t>
+            </a:r>
+          </a:p>
+          <a:p>
+            <a:pPr defTabSz="914072">
+              <a:lnSpc>
+                <a:spcPct val="90000"/>
+              </a:lnSpc>
+              <a:spcAft>
+                <a:spcPts val="600"/>
+              </a:spcAft>
+            </a:pPr>
+            <a:r>
+              <a:rPr lang="en-US" sz="2400" b="1" kern="0" dirty="0">
+                <a:latin typeface="Lucida Console" panose="020B0609040504020204" pitchFamily="49" charset="0"/>
+              </a:rPr>
+              <a:t>    { "street": "1 Redmond Way",</a:t>
+            </a:r>
+          </a:p>
+          <a:p>
+            <a:pPr defTabSz="914072">
+              <a:lnSpc>
+                <a:spcPct val="90000"/>
+              </a:lnSpc>
+              <a:spcAft>
+                <a:spcPts val="600"/>
+              </a:spcAft>
+            </a:pPr>
+            <a:r>
+              <a:rPr lang="en-US" sz="2400" b="1" kern="0" dirty="0">
+                <a:latin typeface="Lucida Console" panose="020B0609040504020204" pitchFamily="49" charset="0"/>
+              </a:rPr>
+              <a:t>      "city": "Redmond", "state": "WA",</a:t>
+            </a:r>
+          </a:p>
+          <a:p>
+            <a:pPr defTabSz="914072">
+              <a:lnSpc>
+                <a:spcPct val="90000"/>
+              </a:lnSpc>
+              <a:spcAft>
+                <a:spcPts val="600"/>
+              </a:spcAft>
+            </a:pPr>
+            <a:r>
+              <a:rPr lang="en-US" sz="2400" b="1" kern="0" dirty="0">
+                <a:latin typeface="Lucida Console" panose="020B0609040504020204" pitchFamily="49" charset="0"/>
+              </a:rPr>
+              <a:t>      "zip": 98052}</a:t>
+            </a:r>
+          </a:p>
+          <a:p>
+            <a:pPr defTabSz="914072">
+              <a:lnSpc>
+                <a:spcPct val="90000"/>
+              </a:lnSpc>
+              <a:spcAft>
+                <a:spcPts val="600"/>
+              </a:spcAft>
+            </a:pPr>
+            <a:r>
+              <a:rPr lang="en-US" sz="2400" b="1" kern="0" dirty="0">
+                <a:latin typeface="Lucida Console" panose="020B0609040504020204" pitchFamily="49" charset="0"/>
+              </a:rPr>
+              <a:t>  ],</a:t>
+            </a:r>
+          </a:p>
+          <a:p>
+            <a:pPr defTabSz="914072">
+              <a:lnSpc>
+                <a:spcPct val="90000"/>
+              </a:lnSpc>
+              <a:spcAft>
+                <a:spcPts val="600"/>
+              </a:spcAft>
+            </a:pPr>
+            <a:r>
+              <a:rPr lang="en-US" sz="2400" b="1" kern="0" dirty="0">
+                <a:latin typeface="Lucida Console" panose="020B0609040504020204" pitchFamily="49" charset="0"/>
+              </a:rPr>
+              <a:t>  "</a:t>
+            </a:r>
+            <a:r>
+              <a:rPr lang="en-US" sz="2400" b="1" kern="0" dirty="0" err="1">
+                <a:latin typeface="Lucida Console" panose="020B0609040504020204" pitchFamily="49" charset="0"/>
+              </a:rPr>
+              <a:t>contactDetails</a:t>
+            </a:r>
+            <a:r>
+              <a:rPr lang="en-US" sz="2400" b="1" kern="0" dirty="0">
+                <a:latin typeface="Lucida Console" panose="020B0609040504020204" pitchFamily="49" charset="0"/>
+              </a:rPr>
+              <a:t>": [</a:t>
+            </a:r>
+          </a:p>
+          <a:p>
+            <a:pPr defTabSz="914072">
+              <a:lnSpc>
+                <a:spcPct val="90000"/>
+              </a:lnSpc>
+              <a:spcAft>
+                <a:spcPts val="600"/>
+              </a:spcAft>
+            </a:pPr>
+            <a:r>
+              <a:rPr lang="en-US" sz="2400" b="1" kern="0" dirty="0">
+                <a:latin typeface="Lucida Console" panose="020B0609040504020204" pitchFamily="49" charset="0"/>
+              </a:rPr>
+              <a:t>    {"type": "home", "detail": “555-1212"},</a:t>
+            </a:r>
+          </a:p>
+          <a:p>
+            <a:pPr defTabSz="914072">
+              <a:lnSpc>
+                <a:spcPct val="90000"/>
+              </a:lnSpc>
+              <a:spcAft>
+                <a:spcPts val="600"/>
+              </a:spcAft>
+            </a:pPr>
+            <a:r>
+              <a:rPr lang="en-US" sz="2400" b="1" kern="0" dirty="0">
+                <a:latin typeface="Lucida Console" panose="020B0609040504020204" pitchFamily="49" charset="0"/>
+              </a:rPr>
+              <a:t>    {"type": "email", "detail": “me@ms.com"}</a:t>
+            </a:r>
+          </a:p>
+          <a:p>
+            <a:pPr defTabSz="914072">
+              <a:lnSpc>
+                <a:spcPct val="90000"/>
+              </a:lnSpc>
+              <a:spcAft>
+                <a:spcPts val="600"/>
+              </a:spcAft>
+            </a:pPr>
+            <a:r>
+              <a:rPr lang="en-US" sz="2400" b="1" kern="0" dirty="0">
+                <a:latin typeface="Lucida Console" panose="020B0609040504020204" pitchFamily="49" charset="0"/>
+              </a:rPr>
+              <a:t>  ],</a:t>
+            </a:r>
+          </a:p>
+          <a:p>
+            <a:pPr defTabSz="914072">
+              <a:lnSpc>
+                <a:spcPct val="90000"/>
+              </a:lnSpc>
+              <a:spcAft>
+                <a:spcPts val="600"/>
+              </a:spcAft>
+            </a:pPr>
+            <a:r>
+              <a:rPr lang="en-US" sz="2400" b="1" kern="0" dirty="0">
+                <a:latin typeface="Lucida Console" panose="020B0609040504020204" pitchFamily="49" charset="0"/>
+              </a:rPr>
+              <a:t>    ...</a:t>
+            </a:r>
+          </a:p>
+          <a:p>
+            <a:pPr defTabSz="914072">
+              <a:lnSpc>
+                <a:spcPct val="90000"/>
+              </a:lnSpc>
+              <a:spcAft>
+                <a:spcPts val="600"/>
+              </a:spcAft>
+            </a:pPr>
+            <a:r>
+              <a:rPr lang="en-US" sz="2400" b="1" kern="0" dirty="0">
+                <a:latin typeface="Lucida Console" panose="020B0609040504020204" pitchFamily="49" charset="0"/>
+              </a:rPr>
+              <a:t>}</a:t>
+            </a:r>
+          </a:p>
+        </p:txBody>
+      </p:sp>
+      <p:sp>
+        <p:nvSpPr>
+          <p:cNvPr id="51" name="TextBox 50"/>
+          <p:cNvSpPr txBox="1"/>
+          <p:nvPr/>
+        </p:nvSpPr>
+        <p:spPr>
+          <a:xfrm>
+            <a:off x="838047" y="3007393"/>
+            <a:ext cx="2790124" cy="871179"/>
+          </a:xfrm>
+          <a:prstGeom prst="rect">
+            <a:avLst/>
+          </a:prstGeom>
+          <a:noFill/>
+          <a:ln w="28575">
+            <a:solidFill>
+              <a:schemeClr val="tx1"/>
+            </a:solidFill>
+          </a:ln>
+        </p:spPr>
+        <p:txBody>
+          <a:bodyPr wrap="square" lIns="182827" tIns="146262" rIns="182827" bIns="146262" rtlCol="0">
+            <a:spAutoFit/>
+          </a:bodyPr>
+          <a:lstStyle/>
+          <a:p>
+            <a:pPr defTabSz="914072">
+              <a:lnSpc>
+                <a:spcPct val="90000"/>
+              </a:lnSpc>
+              <a:spcAft>
+                <a:spcPts val="600"/>
+              </a:spcAft>
+            </a:pPr>
+            <a:r>
+              <a:rPr lang="en-US" sz="1801" b="1" kern="0" dirty="0">
+                <a:latin typeface="Segoe UI"/>
+              </a:rPr>
+              <a:t>Address</a:t>
+            </a:r>
+          </a:p>
+          <a:p>
+            <a:pPr defTabSz="914072">
+              <a:lnSpc>
+                <a:spcPct val="90000"/>
+              </a:lnSpc>
+              <a:spcAft>
+                <a:spcPts val="600"/>
+              </a:spcAft>
+            </a:pPr>
+            <a:r>
+              <a:rPr lang="en-US" sz="1801" b="1" kern="0" dirty="0">
+                <a:latin typeface="Segoe UI"/>
+              </a:rPr>
+              <a:t>…</a:t>
+            </a:r>
+          </a:p>
+        </p:txBody>
+      </p:sp>
+      <p:sp>
+        <p:nvSpPr>
+          <p:cNvPr id="52" name="TextBox 51"/>
+          <p:cNvSpPr txBox="1"/>
+          <p:nvPr/>
+        </p:nvSpPr>
+        <p:spPr>
+          <a:xfrm>
+            <a:off x="838047" y="3878155"/>
+            <a:ext cx="2790124" cy="871179"/>
+          </a:xfrm>
+          <a:prstGeom prst="rect">
+            <a:avLst/>
+          </a:prstGeom>
+          <a:noFill/>
+          <a:ln w="28575">
+            <a:solidFill>
+              <a:schemeClr val="tx1"/>
+            </a:solidFill>
+          </a:ln>
+        </p:spPr>
+        <p:txBody>
+          <a:bodyPr wrap="square" lIns="182827" tIns="146262" rIns="182827" bIns="146262" rtlCol="0">
+            <a:spAutoFit/>
+          </a:bodyPr>
+          <a:lstStyle/>
+          <a:p>
+            <a:pPr defTabSz="914072">
+              <a:lnSpc>
+                <a:spcPct val="90000"/>
+              </a:lnSpc>
+              <a:spcAft>
+                <a:spcPts val="600"/>
+              </a:spcAft>
+            </a:pPr>
+            <a:r>
+              <a:rPr lang="en-US" sz="1801" b="1" kern="0" dirty="0">
+                <a:latin typeface="Segoe UI"/>
+              </a:rPr>
+              <a:t>Address</a:t>
+            </a:r>
+          </a:p>
+          <a:p>
+            <a:pPr defTabSz="914072">
+              <a:lnSpc>
+                <a:spcPct val="90000"/>
+              </a:lnSpc>
+              <a:spcAft>
+                <a:spcPts val="600"/>
+              </a:spcAft>
+            </a:pPr>
+            <a:r>
+              <a:rPr lang="en-US" sz="1801" b="1" kern="0" dirty="0">
+                <a:latin typeface="Segoe UI"/>
+              </a:rPr>
+              <a:t>…</a:t>
+            </a:r>
+          </a:p>
+        </p:txBody>
+      </p:sp>
+      <p:sp>
+        <p:nvSpPr>
+          <p:cNvPr id="54" name="TextBox 53"/>
+          <p:cNvSpPr txBox="1"/>
+          <p:nvPr/>
+        </p:nvSpPr>
+        <p:spPr>
+          <a:xfrm>
+            <a:off x="657216" y="4995914"/>
+            <a:ext cx="3047135" cy="1523922"/>
+          </a:xfrm>
+          <a:prstGeom prst="rect">
+            <a:avLst/>
+          </a:prstGeom>
+          <a:noFill/>
+          <a:ln w="28575">
+            <a:solidFill>
+              <a:schemeClr val="tx1"/>
+            </a:solidFill>
+          </a:ln>
+        </p:spPr>
+        <p:txBody>
+          <a:bodyPr wrap="square" lIns="182827" tIns="146262" rIns="182827" bIns="146262" rtlCol="0">
+            <a:spAutoFit/>
+          </a:bodyPr>
+          <a:lstStyle/>
+          <a:p>
+            <a:pPr defTabSz="914072">
+              <a:lnSpc>
+                <a:spcPct val="90000"/>
+              </a:lnSpc>
+              <a:spcAft>
+                <a:spcPts val="600"/>
+              </a:spcAft>
+            </a:pPr>
+            <a:r>
+              <a:rPr lang="en-US" sz="1801" b="1" kern="0" dirty="0" err="1">
+                <a:latin typeface="Segoe UI"/>
+              </a:rPr>
+              <a:t>ContactDetails</a:t>
+            </a:r>
+            <a:endParaRPr lang="en-US" sz="1801" b="1" kern="0" dirty="0">
+              <a:latin typeface="Segoe UI"/>
+            </a:endParaRPr>
+          </a:p>
+          <a:p>
+            <a:pPr defTabSz="914072">
+              <a:lnSpc>
+                <a:spcPct val="90000"/>
+              </a:lnSpc>
+              <a:spcAft>
+                <a:spcPts val="600"/>
+              </a:spcAft>
+            </a:pPr>
+            <a:endParaRPr lang="en-US" sz="1801" b="1" kern="0" dirty="0">
+              <a:latin typeface="Segoe UI"/>
+            </a:endParaRPr>
+          </a:p>
+          <a:p>
+            <a:pPr defTabSz="914072">
+              <a:lnSpc>
+                <a:spcPct val="90000"/>
+              </a:lnSpc>
+              <a:spcAft>
+                <a:spcPts val="600"/>
+              </a:spcAft>
+            </a:pPr>
+            <a:endParaRPr lang="en-US" sz="1801" b="1" kern="0" dirty="0">
+              <a:latin typeface="Segoe UI"/>
+            </a:endParaRPr>
+          </a:p>
+          <a:p>
+            <a:pPr defTabSz="914072">
+              <a:lnSpc>
+                <a:spcPct val="90000"/>
+              </a:lnSpc>
+              <a:spcAft>
+                <a:spcPts val="600"/>
+              </a:spcAft>
+            </a:pPr>
+            <a:endParaRPr lang="en-US" sz="1801" b="1" kern="0" dirty="0">
+              <a:latin typeface="Segoe UI"/>
+            </a:endParaRPr>
+          </a:p>
+        </p:txBody>
+      </p:sp>
+      <p:sp>
+        <p:nvSpPr>
+          <p:cNvPr id="55" name="TextBox 54"/>
+          <p:cNvSpPr txBox="1"/>
+          <p:nvPr/>
+        </p:nvSpPr>
+        <p:spPr>
+          <a:xfrm>
+            <a:off x="819258" y="5474674"/>
+            <a:ext cx="2790124" cy="871179"/>
+          </a:xfrm>
+          <a:prstGeom prst="rect">
+            <a:avLst/>
+          </a:prstGeom>
+          <a:noFill/>
+          <a:ln w="28575">
+            <a:solidFill>
+              <a:schemeClr val="tx1"/>
+            </a:solidFill>
+          </a:ln>
+        </p:spPr>
+        <p:txBody>
+          <a:bodyPr wrap="square" lIns="182827" tIns="146262" rIns="182827" bIns="146262" rtlCol="0">
+            <a:spAutoFit/>
+          </a:bodyPr>
+          <a:lstStyle/>
+          <a:p>
+            <a:pPr defTabSz="914072">
+              <a:lnSpc>
+                <a:spcPct val="90000"/>
+              </a:lnSpc>
+              <a:spcAft>
+                <a:spcPts val="600"/>
+              </a:spcAft>
+            </a:pPr>
+            <a:r>
+              <a:rPr lang="en-US" sz="1801" b="1" kern="0" dirty="0" err="1">
+                <a:latin typeface="Segoe UI"/>
+              </a:rPr>
+              <a:t>ContactDetail</a:t>
+            </a:r>
+            <a:endParaRPr lang="en-US" sz="1801" b="1" kern="0" dirty="0">
+              <a:latin typeface="Segoe UI"/>
+            </a:endParaRPr>
+          </a:p>
+          <a:p>
+            <a:pPr defTabSz="914072">
+              <a:lnSpc>
+                <a:spcPct val="90000"/>
+              </a:lnSpc>
+              <a:spcAft>
+                <a:spcPts val="600"/>
+              </a:spcAft>
+            </a:pPr>
+            <a:r>
+              <a:rPr lang="en-US" sz="1801" b="1" kern="0" dirty="0">
+                <a:latin typeface="Segoe UI"/>
+              </a:rPr>
+              <a:t>…</a:t>
+            </a:r>
+          </a:p>
+        </p:txBody>
+      </p:sp>
+      <p:sp>
+        <p:nvSpPr>
+          <p:cNvPr id="5" name="Title 4"/>
+          <p:cNvSpPr>
+            <a:spLocks noGrp="1"/>
+          </p:cNvSpPr>
+          <p:nvPr>
+            <p:ph type="title"/>
+          </p:nvPr>
+        </p:nvSpPr>
+        <p:spPr/>
+        <p:txBody>
+          <a:bodyPr/>
+          <a:lstStyle/>
+          <a:p>
+            <a:r>
+              <a:rPr lang="en-US" dirty="0">
+                <a:solidFill>
+                  <a:schemeClr val="tx1"/>
+                </a:solidFill>
+              </a:rPr>
+              <a:t>Modeling Data: The Document Way</a:t>
+            </a:r>
+          </a:p>
+        </p:txBody>
+      </p:sp>
+    </p:spTree>
+    <p:extLst>
+      <p:ext uri="{BB962C8B-B14F-4D97-AF65-F5344CB8AC3E}">
+        <p14:creationId xmlns:p14="http://schemas.microsoft.com/office/powerpoint/2010/main" val="4067914718"/>
+      </p:ext>
+    </p:extLst>
+  </p:cSld>
+  <p:clrMapOvr>
+    <a:masterClrMapping/>
+  </p:clrMapOvr>
+</p:sld>
+</file>
+
+<file path=ppt/slides/slide11.xml><?xml version="1.0" encoding="utf-8"?>
 <p:sld xmlns:a="http://schemas.openxmlformats.org/drawingml/2006/main" xmlns:r="http://schemas.openxmlformats.org/officeDocument/2006/relationships" xmlns:p="http://schemas.openxmlformats.org/presentationml/2006/main">
   <p:cSld>
     <p:spTree>
@@ -12650,7 +13546,7 @@
           <a:p>
             <a:fld id="{E8A1165C-31A9-413F-A1AE-296F7D5CA11A}" type="slidenum">
               <a:rPr lang="en-US" smtClean="0"/>
-              <a:t>10</a:t>
+              <a:t>11</a:t>
             </a:fld>
             <a:endParaRPr lang="en-US"/>
           </a:p>
@@ -12731,7 +13627,7 @@
 </p:sld>
 </file>
 
-<file path=ppt/slides/slide11.xml><?xml version="1.0" encoding="utf-8"?>
+<file path=ppt/slides/slide12.xml><?xml version="1.0" encoding="utf-8"?>
 <p:sld xmlns:a="http://schemas.openxmlformats.org/drawingml/2006/main" xmlns:r="http://schemas.openxmlformats.org/officeDocument/2006/relationships" xmlns:p="http://schemas.openxmlformats.org/presentationml/2006/main">
   <p:cSld>
     <p:spTree>
@@ -19862,7 +20758,7 @@
 </p:sld>
 </file>
 
-<file path=ppt/slides/slide12.xml><?xml version="1.0" encoding="utf-8"?>
+<file path=ppt/slides/slide13.xml><?xml version="1.0" encoding="utf-8"?>
 <p:sld xmlns:a="http://schemas.openxmlformats.org/drawingml/2006/main" xmlns:r="http://schemas.openxmlformats.org/officeDocument/2006/relationships" xmlns:p="http://schemas.openxmlformats.org/presentationml/2006/main">
   <p:cSld>
     <p:spTree>
@@ -19905,142 +20801,6 @@
     <p:extLst>
       <p:ext uri="{BB962C8B-B14F-4D97-AF65-F5344CB8AC3E}">
         <p14:creationId xmlns:p14="http://schemas.microsoft.com/office/powerpoint/2010/main" val="203203085"/>
-      </p:ext>
-    </p:extLst>
-  </p:cSld>
-  <p:clrMapOvr>
-    <a:masterClrMapping/>
-  </p:clrMapOvr>
-  <mc:AlternateContent xmlns:mc="http://schemas.openxmlformats.org/markup-compatibility/2006" xmlns:p14="http://schemas.microsoft.com/office/powerpoint/2010/main">
-    <mc:Choice Requires="p14">
-      <p:transition spd="med" p14:dur="700">
-        <p:fade/>
-      </p:transition>
-    </mc:Choice>
-    <mc:Fallback xmlns="">
-      <p:transition spd="med">
-        <p:fade/>
-      </p:transition>
-    </mc:Fallback>
-  </mc:AlternateContent>
-</p:sld>
-</file>
-
-<file path=ppt/slides/slide13.xml><?xml version="1.0" encoding="utf-8"?>
-<p:sld xmlns:a="http://schemas.openxmlformats.org/drawingml/2006/main" xmlns:r="http://schemas.openxmlformats.org/officeDocument/2006/relationships" xmlns:p="http://schemas.openxmlformats.org/presentationml/2006/main">
-  <p:cSld>
-    <p:spTree>
-      <p:nvGrpSpPr>
-        <p:cNvPr id="1" name=""/>
-        <p:cNvGrpSpPr/>
-        <p:nvPr/>
-      </p:nvGrpSpPr>
-      <p:grpSpPr>
-        <a:xfrm>
-          <a:off x="0" y="0"/>
-          <a:ext cx="0" cy="0"/>
-          <a:chOff x="0" y="0"/>
-          <a:chExt cx="0" cy="0"/>
-        </a:xfrm>
-      </p:grpSpPr>
-      <p:sp>
-        <p:nvSpPr>
-          <p:cNvPr id="4" name="Title 3"/>
-          <p:cNvSpPr>
-            <a:spLocks noGrp="1"/>
-          </p:cNvSpPr>
-          <p:nvPr>
-            <p:ph type="title"/>
-          </p:nvPr>
-        </p:nvSpPr>
-        <p:spPr/>
-        <p:txBody>
-          <a:bodyPr/>
-          <a:lstStyle/>
-          <a:p>
-            <a:r>
-              <a:rPr lang="en-US" dirty="0"/>
-              <a:t>DocumentDB Documents – Just POCOs</a:t>
-            </a:r>
-          </a:p>
-        </p:txBody>
-      </p:sp>
-      <p:sp>
-        <p:nvSpPr>
-          <p:cNvPr id="5" name="Text Placeholder 4"/>
-          <p:cNvSpPr>
-            <a:spLocks noGrp="1"/>
-          </p:cNvSpPr>
-          <p:nvPr>
-            <p:ph type="body" sz="quarter" idx="10"/>
-          </p:nvPr>
-        </p:nvSpPr>
-        <p:spPr>
-          <a:xfrm>
-            <a:off x="274638" y="1221157"/>
-            <a:ext cx="11887199" cy="5110630"/>
-          </a:xfrm>
-        </p:spPr>
-        <p:txBody>
-          <a:bodyPr/>
-          <a:lstStyle/>
-          <a:p>
-            <a:r>
-              <a:rPr lang="en-US" dirty="0"/>
-              <a:t> public class ImageMetadata</a:t>
-            </a:r>
-          </a:p>
-          <a:p>
-            <a:r>
-              <a:rPr lang="en-US" dirty="0"/>
-              <a:t>    {</a:t>
-            </a:r>
-          </a:p>
-          <a:p>
-            <a:r>
-              <a:rPr lang="en-US" dirty="0"/>
-              <a:t>        public ImageMetadata()</a:t>
-            </a:r>
-          </a:p>
-          <a:p>
-            <a:r>
-              <a:rPr lang="en-US" dirty="0"/>
-              <a:t>        {</a:t>
-            </a:r>
-          </a:p>
-          <a:p>
-            <a:r>
-              <a:rPr lang="en-US" dirty="0"/>
-              <a:t>            </a:t>
-            </a:r>
-          </a:p>
-          <a:p>
-            <a:r>
-              <a:rPr lang="en-US" dirty="0"/>
-              <a:t>        }</a:t>
-            </a:r>
-          </a:p>
-          <a:p>
-            <a:endParaRPr lang="en-US" dirty="0"/>
-          </a:p>
-          <a:p>
-            <a:r>
-              <a:rPr lang="en-US" dirty="0"/>
-              <a:t>        [JsonProperty(PropertyName = "id")]</a:t>
-            </a:r>
-          </a:p>
-          <a:p>
-            <a:r>
-              <a:rPr lang="en-US" dirty="0"/>
-              <a:t>        public string Id { get; set; }</a:t>
-            </a:r>
-          </a:p>
-        </p:txBody>
-      </p:sp>
-    </p:spTree>
-    <p:extLst>
-      <p:ext uri="{BB962C8B-B14F-4D97-AF65-F5344CB8AC3E}">
-        <p14:creationId xmlns:p14="http://schemas.microsoft.com/office/powerpoint/2010/main" val="1041029672"/>
       </p:ext>
     </p:extLst>
   </p:cSld>
@@ -20096,6 +20856,142 @@
           <a:p>
             <a:r>
               <a:rPr lang="en-US" dirty="0"/>
+              <a:t>DocumentDB Documents – Just POCOs</a:t>
+            </a:r>
+          </a:p>
+        </p:txBody>
+      </p:sp>
+      <p:sp>
+        <p:nvSpPr>
+          <p:cNvPr id="5" name="Text Placeholder 4"/>
+          <p:cNvSpPr>
+            <a:spLocks noGrp="1"/>
+          </p:cNvSpPr>
+          <p:nvPr>
+            <p:ph type="body" sz="quarter" idx="10"/>
+          </p:nvPr>
+        </p:nvSpPr>
+        <p:spPr>
+          <a:xfrm>
+            <a:off x="274638" y="1221157"/>
+            <a:ext cx="11887199" cy="5110630"/>
+          </a:xfrm>
+        </p:spPr>
+        <p:txBody>
+          <a:bodyPr/>
+          <a:lstStyle/>
+          <a:p>
+            <a:r>
+              <a:rPr lang="en-US" dirty="0"/>
+              <a:t> public class ImageMetadata</a:t>
+            </a:r>
+          </a:p>
+          <a:p>
+            <a:r>
+              <a:rPr lang="en-US" dirty="0"/>
+              <a:t>    {</a:t>
+            </a:r>
+          </a:p>
+          <a:p>
+            <a:r>
+              <a:rPr lang="en-US" dirty="0"/>
+              <a:t>        public ImageMetadata()</a:t>
+            </a:r>
+          </a:p>
+          <a:p>
+            <a:r>
+              <a:rPr lang="en-US" dirty="0"/>
+              <a:t>        {</a:t>
+            </a:r>
+          </a:p>
+          <a:p>
+            <a:r>
+              <a:rPr lang="en-US" dirty="0"/>
+              <a:t>            </a:t>
+            </a:r>
+          </a:p>
+          <a:p>
+            <a:r>
+              <a:rPr lang="en-US" dirty="0"/>
+              <a:t>        }</a:t>
+            </a:r>
+          </a:p>
+          <a:p>
+            <a:endParaRPr lang="en-US" dirty="0"/>
+          </a:p>
+          <a:p>
+            <a:r>
+              <a:rPr lang="en-US" dirty="0"/>
+              <a:t>        [JsonProperty(PropertyName = "id")]</a:t>
+            </a:r>
+          </a:p>
+          <a:p>
+            <a:r>
+              <a:rPr lang="en-US" dirty="0"/>
+              <a:t>        public string Id { get; set; }</a:t>
+            </a:r>
+          </a:p>
+        </p:txBody>
+      </p:sp>
+    </p:spTree>
+    <p:extLst>
+      <p:ext uri="{BB962C8B-B14F-4D97-AF65-F5344CB8AC3E}">
+        <p14:creationId xmlns:p14="http://schemas.microsoft.com/office/powerpoint/2010/main" val="1041029672"/>
+      </p:ext>
+    </p:extLst>
+  </p:cSld>
+  <p:clrMapOvr>
+    <a:masterClrMapping/>
+  </p:clrMapOvr>
+  <mc:AlternateContent xmlns:mc="http://schemas.openxmlformats.org/markup-compatibility/2006" xmlns:p14="http://schemas.microsoft.com/office/powerpoint/2010/main">
+    <mc:Choice Requires="p14">
+      <p:transition spd="med" p14:dur="700">
+        <p:fade/>
+      </p:transition>
+    </mc:Choice>
+    <mc:Fallback xmlns="">
+      <p:transition spd="med">
+        <p:fade/>
+      </p:transition>
+    </mc:Fallback>
+  </mc:AlternateContent>
+</p:sld>
+</file>
+
+<file path=ppt/slides/slide15.xml><?xml version="1.0" encoding="utf-8"?>
+<p:sld xmlns:a="http://schemas.openxmlformats.org/drawingml/2006/main" xmlns:r="http://schemas.openxmlformats.org/officeDocument/2006/relationships" xmlns:p="http://schemas.openxmlformats.org/presentationml/2006/main">
+  <p:cSld>
+    <p:spTree>
+      <p:nvGrpSpPr>
+        <p:cNvPr id="1" name=""/>
+        <p:cNvGrpSpPr/>
+        <p:nvPr/>
+      </p:nvGrpSpPr>
+      <p:grpSpPr>
+        <a:xfrm>
+          <a:off x="0" y="0"/>
+          <a:ext cx="0" cy="0"/>
+          <a:chOff x="0" y="0"/>
+          <a:chExt cx="0" cy="0"/>
+        </a:xfrm>
+      </p:grpSpPr>
+      <p:sp>
+        <p:nvSpPr>
+          <p:cNvPr id="4" name="Title 3"/>
+          <p:cNvSpPr>
+            <a:spLocks noGrp="1"/>
+          </p:cNvSpPr>
+          <p:nvPr>
+            <p:ph type="title"/>
+          </p:nvPr>
+        </p:nvSpPr>
+        <p:spPr/>
+        <p:txBody>
+          <a:bodyPr/>
+          <a:lstStyle/>
+          <a:p>
+            <a:r>
+              <a:rPr lang="en-US" dirty="0"/>
               <a:t>Querying Documents</a:t>
             </a:r>
           </a:p>
@@ -20193,7 +21089,7 @@
 </p:sld>
 </file>
 
-<file path=ppt/slides/slide15.xml><?xml version="1.0" encoding="utf-8"?>
+<file path=ppt/slides/slide16.xml><?xml version="1.0" encoding="utf-8"?>
 <p:sld xmlns:a="http://schemas.openxmlformats.org/drawingml/2006/main" xmlns:r="http://schemas.openxmlformats.org/officeDocument/2006/relationships" xmlns:p="http://schemas.openxmlformats.org/presentationml/2006/main">
   <p:cSld>
     <p:spTree>
@@ -20351,6 +21247,136 @@
           <a:chExt cx="0" cy="0"/>
         </a:xfrm>
       </p:grpSpPr>
+      <p:sp>
+        <p:nvSpPr>
+          <p:cNvPr id="2" name="Title 1"/>
+          <p:cNvSpPr>
+            <a:spLocks noGrp="1"/>
+          </p:cNvSpPr>
+          <p:nvPr>
+            <p:ph type="title"/>
+          </p:nvPr>
+        </p:nvSpPr>
+        <p:spPr/>
+        <p:txBody>
+          <a:bodyPr/>
+          <a:lstStyle/>
+          <a:p>
+            <a:r>
+              <a:rPr lang="en-US" dirty="0"/>
+              <a:t>Scenario</a:t>
+            </a:r>
+          </a:p>
+        </p:txBody>
+      </p:sp>
+      <p:sp>
+        <p:nvSpPr>
+          <p:cNvPr id="3" name="Text Placeholder 2"/>
+          <p:cNvSpPr>
+            <a:spLocks noGrp="1"/>
+          </p:cNvSpPr>
+          <p:nvPr>
+            <p:ph type="body" sz="quarter" idx="10"/>
+          </p:nvPr>
+        </p:nvSpPr>
+        <p:spPr>
+          <a:xfrm>
+            <a:off x="261409" y="1439862"/>
+            <a:ext cx="4876735" cy="4727448"/>
+          </a:xfrm>
+        </p:spPr>
+        <p:txBody>
+          <a:bodyPr/>
+          <a:lstStyle/>
+          <a:p>
+            <a:r>
+              <a:rPr lang="en-US" dirty="0"/>
+              <a:t>Intelligence from Images</a:t>
+            </a:r>
+          </a:p>
+          <a:p>
+            <a:r>
+              <a:rPr lang="en-US" dirty="0"/>
+              <a:t>Vision Services</a:t>
+            </a:r>
+          </a:p>
+          <a:p>
+            <a:r>
+              <a:rPr lang="en-US" dirty="0"/>
+              <a:t>Cloud Storage</a:t>
+            </a:r>
+          </a:p>
+          <a:p>
+            <a:r>
+              <a:rPr lang="en-US" dirty="0"/>
+              <a:t>Search</a:t>
+            </a:r>
+          </a:p>
+          <a:p>
+            <a:r>
+              <a:rPr lang="en-US" dirty="0"/>
+              <a:t>Conversation and Language Understanding</a:t>
+            </a:r>
+          </a:p>
+        </p:txBody>
+      </p:sp>
+      <p:pic>
+        <p:nvPicPr>
+          <p:cNvPr id="5" name="Picture 4"/>
+          <p:cNvPicPr>
+            <a:picLocks noChangeAspect="1"/>
+          </p:cNvPicPr>
+          <p:nvPr/>
+        </p:nvPicPr>
+        <p:blipFill>
+          <a:blip r:embed="rId2"/>
+          <a:stretch>
+            <a:fillRect/>
+          </a:stretch>
+        </p:blipFill>
+        <p:spPr>
+          <a:xfrm>
+            <a:off x="5456237" y="1212849"/>
+            <a:ext cx="6172200" cy="5254085"/>
+          </a:xfrm>
+          <a:prstGeom prst="rect">
+            <a:avLst/>
+          </a:prstGeom>
+        </p:spPr>
+      </p:pic>
+    </p:spTree>
+    <p:extLst>
+      <p:ext uri="{BB962C8B-B14F-4D97-AF65-F5344CB8AC3E}">
+        <p14:creationId xmlns:p14="http://schemas.microsoft.com/office/powerpoint/2010/main" val="3831601975"/>
+      </p:ext>
+    </p:extLst>
+  </p:cSld>
+  <p:clrMapOvr>
+    <a:masterClrMapping/>
+  </p:clrMapOvr>
+  <p:transition>
+    <p:fade/>
+  </p:transition>
+</p:sld>
+</file>
+
+<file path=ppt/slides/slide4.xml><?xml version="1.0" encoding="utf-8"?>
+<p:sld xmlns:a="http://schemas.openxmlformats.org/drawingml/2006/main" xmlns:r="http://schemas.openxmlformats.org/officeDocument/2006/relationships" xmlns:p="http://schemas.openxmlformats.org/presentationml/2006/main">
+  <p:cSld>
+    <p:spTree>
+      <p:nvGrpSpPr>
+        <p:cNvPr id="1" name=""/>
+        <p:cNvGrpSpPr/>
+        <p:nvPr/>
+      </p:nvGrpSpPr>
+      <p:grpSpPr>
+        <a:xfrm>
+          <a:off x="0" y="0"/>
+          <a:ext cx="0" cy="0"/>
+          <a:chOff x="0" y="0"/>
+          <a:chExt cx="0" cy="0"/>
+        </a:xfrm>
+      </p:grpSpPr>
       <p:cxnSp>
         <p:nvCxnSpPr>
           <p:cNvPr id="2" name="Straight Connector 1"/>
@@ -20808,7 +21834,7 @@
 </p:sld>
 </file>
 
-<file path=ppt/slides/slide4.xml><?xml version="1.0" encoding="utf-8"?>
+<file path=ppt/slides/slide5.xml><?xml version="1.0" encoding="utf-8"?>
 <p:sld xmlns:a="http://schemas.openxmlformats.org/drawingml/2006/main" xmlns:r="http://schemas.openxmlformats.org/officeDocument/2006/relationships" xmlns:p="http://schemas.openxmlformats.org/presentationml/2006/main">
   <p:cSld>
     <p:spTree>
@@ -23906,7 +24932,7 @@
 </p:sld>
 </file>
 
-<file path=ppt/slides/slide5.xml><?xml version="1.0" encoding="utf-8"?>
+<file path=ppt/slides/slide6.xml><?xml version="1.0" encoding="utf-8"?>
 <p:sld xmlns:a="http://schemas.openxmlformats.org/drawingml/2006/main" xmlns:r="http://schemas.openxmlformats.org/officeDocument/2006/relationships" xmlns:p="http://schemas.openxmlformats.org/presentationml/2006/main">
   <p:cSld>
     <p:spTree>
@@ -24209,7 +25235,7 @@
 </p:sld>
 </file>
 
-<file path=ppt/slides/slide6.xml><?xml version="1.0" encoding="utf-8"?>
+<file path=ppt/slides/slide7.xml><?xml version="1.0" encoding="utf-8"?>
 <p:sld xmlns:a="http://schemas.openxmlformats.org/drawingml/2006/main" xmlns:r="http://schemas.openxmlformats.org/officeDocument/2006/relationships" xmlns:p="http://schemas.openxmlformats.org/presentationml/2006/main">
   <p:cSld>
     <p:spTree>
@@ -24644,7 +25670,7 @@
 </p:sld>
 </file>
 
-<file path=ppt/slides/slide7.xml><?xml version="1.0" encoding="utf-8"?>
+<file path=ppt/slides/slide8.xml><?xml version="1.0" encoding="utf-8"?>
 <p:sld xmlns:a="http://schemas.openxmlformats.org/drawingml/2006/main" xmlns:r="http://schemas.openxmlformats.org/officeDocument/2006/relationships" xmlns:p="http://schemas.openxmlformats.org/presentationml/2006/main">
   <p:cSld>
     <p:spTree>
@@ -27146,7 +28172,7 @@
 </p:sld>
 </file>
 
-<file path=ppt/slides/slide8.xml><?xml version="1.0" encoding="utf-8"?>
+<file path=ppt/slides/slide9.xml><?xml version="1.0" encoding="utf-8"?>
 <p:sld xmlns:a="http://schemas.openxmlformats.org/drawingml/2006/main" xmlns:r="http://schemas.openxmlformats.org/officeDocument/2006/relationships" xmlns:p="http://schemas.openxmlformats.org/presentationml/2006/main">
   <p:cSld>
     <p:spTree>
@@ -28432,900 +29458,6 @@
   <p:transition>
     <p:fade/>
   </p:transition>
-</p:sld>
-</file>
-
-<file path=ppt/slides/slide9.xml><?xml version="1.0" encoding="utf-8"?>
-<p:sld xmlns:a="http://schemas.openxmlformats.org/drawingml/2006/main" xmlns:r="http://schemas.openxmlformats.org/officeDocument/2006/relationships" xmlns:p="http://schemas.openxmlformats.org/presentationml/2006/main">
-  <p:cSld>
-    <p:spTree>
-      <p:nvGrpSpPr>
-        <p:cNvPr id="1" name=""/>
-        <p:cNvGrpSpPr/>
-        <p:nvPr/>
-      </p:nvGrpSpPr>
-      <p:grpSpPr>
-        <a:xfrm>
-          <a:off x="0" y="0"/>
-          <a:ext cx="0" cy="0"/>
-          <a:chOff x="0" y="0"/>
-          <a:chExt cx="0" cy="0"/>
-        </a:xfrm>
-      </p:grpSpPr>
-      <p:sp>
-        <p:nvSpPr>
-          <p:cNvPr id="4" name="Rectangle 3"/>
-          <p:cNvSpPr/>
-          <p:nvPr/>
-        </p:nvSpPr>
-        <p:spPr bwMode="auto">
-          <a:xfrm>
-            <a:off x="660524" y="1592804"/>
-            <a:ext cx="3047135" cy="4926172"/>
-          </a:xfrm>
-          <a:prstGeom prst="rect">
-            <a:avLst/>
-          </a:prstGeom>
-          <a:noFill/>
-          <a:ln w="28575">
-            <a:solidFill>
-              <a:schemeClr val="tx1"/>
-            </a:solidFill>
-            <a:headEnd type="none" w="med" len="med"/>
-            <a:tailEnd type="none" w="med" len="med"/>
-          </a:ln>
-        </p:spPr>
-        <p:style>
-          <a:lnRef idx="2">
-            <a:schemeClr val="accent1">
-              <a:shade val="50000"/>
-            </a:schemeClr>
-          </a:lnRef>
-          <a:fillRef idx="1">
-            <a:schemeClr val="accent1"/>
-          </a:fillRef>
-          <a:effectRef idx="0">
-            <a:schemeClr val="accent1"/>
-          </a:effectRef>
-          <a:fontRef idx="minor">
-            <a:schemeClr val="lt1"/>
-          </a:fontRef>
-        </p:style>
-        <p:txBody>
-          <a:bodyPr vert="horz" wrap="square" lIns="0" tIns="46623" rIns="0" bIns="46623" numCol="1" rtlCol="0" anchor="ctr" anchorCtr="0" compatLnSpc="1">
-            <a:prstTxWarp prst="textNoShape">
-              <a:avLst/>
-            </a:prstTxWarp>
-          </a:bodyPr>
-          <a:lstStyle/>
-          <a:p>
-            <a:pPr algn="ctr" defTabSz="932137" fontAlgn="base">
-              <a:spcBef>
-                <a:spcPct val="0"/>
-              </a:spcBef>
-              <a:spcAft>
-                <a:spcPct val="0"/>
-              </a:spcAft>
-            </a:pPr>
-            <a:endParaRPr lang="en-US" sz="2000" kern="0" dirty="0">
-              <a:solidFill>
-                <a:schemeClr val="tx1"/>
-              </a:solidFill>
-              <a:latin typeface="Segoe UI"/>
-            </a:endParaRPr>
-          </a:p>
-        </p:txBody>
-      </p:sp>
-      <p:sp>
-        <p:nvSpPr>
-          <p:cNvPr id="13" name="TextBox 12"/>
-          <p:cNvSpPr txBox="1"/>
-          <p:nvPr/>
-        </p:nvSpPr>
-        <p:spPr>
-          <a:xfrm>
-            <a:off x="660524" y="1592803"/>
-            <a:ext cx="3047135" cy="544808"/>
-          </a:xfrm>
-          <a:prstGeom prst="rect">
-            <a:avLst/>
-          </a:prstGeom>
-          <a:noFill/>
-          <a:ln w="28575">
-            <a:solidFill>
-              <a:schemeClr val="tx1"/>
-            </a:solidFill>
-          </a:ln>
-        </p:spPr>
-        <p:txBody>
-          <a:bodyPr wrap="square" lIns="182827" tIns="146262" rIns="182827" bIns="146262" rtlCol="0">
-            <a:spAutoFit/>
-          </a:bodyPr>
-          <a:lstStyle/>
-          <a:p>
-            <a:pPr defTabSz="914072">
-              <a:lnSpc>
-                <a:spcPct val="90000"/>
-              </a:lnSpc>
-              <a:spcAft>
-                <a:spcPts val="600"/>
-              </a:spcAft>
-            </a:pPr>
-            <a:r>
-              <a:rPr lang="en-US" sz="1801" b="1" kern="0" dirty="0">
-                <a:latin typeface="Segoe UI"/>
-              </a:rPr>
-              <a:t>Person</a:t>
-            </a:r>
-          </a:p>
-        </p:txBody>
-      </p:sp>
-      <p:cxnSp>
-        <p:nvCxnSpPr>
-          <p:cNvPr id="34" name="Straight Connector 33"/>
-          <p:cNvCxnSpPr/>
-          <p:nvPr/>
-        </p:nvCxnSpPr>
-        <p:spPr>
-          <a:xfrm>
-            <a:off x="673221" y="2506943"/>
-            <a:ext cx="3034438" cy="0"/>
-          </a:xfrm>
-          <a:prstGeom prst="line">
-            <a:avLst/>
-          </a:prstGeom>
-          <a:ln>
-            <a:solidFill>
-              <a:schemeClr val="tx1"/>
-            </a:solidFill>
-            <a:prstDash val="dashDot"/>
-            <a:headEnd type="none"/>
-            <a:tailEnd type="none"/>
-          </a:ln>
-        </p:spPr>
-        <p:style>
-          <a:lnRef idx="1">
-            <a:schemeClr val="accent1"/>
-          </a:lnRef>
-          <a:fillRef idx="0">
-            <a:schemeClr val="accent1"/>
-          </a:fillRef>
-          <a:effectRef idx="0">
-            <a:schemeClr val="accent1"/>
-          </a:effectRef>
-          <a:fontRef idx="minor">
-            <a:schemeClr val="tx1"/>
-          </a:fontRef>
-        </p:style>
-      </p:cxnSp>
-      <p:sp>
-        <p:nvSpPr>
-          <p:cNvPr id="38" name="TextBox 37"/>
-          <p:cNvSpPr txBox="1"/>
-          <p:nvPr/>
-        </p:nvSpPr>
-        <p:spPr>
-          <a:xfrm>
-            <a:off x="789610" y="2080182"/>
-            <a:ext cx="617691" cy="516723"/>
-          </a:xfrm>
-          <a:prstGeom prst="rect">
-            <a:avLst/>
-          </a:prstGeom>
-          <a:noFill/>
-        </p:spPr>
-        <p:txBody>
-          <a:bodyPr wrap="none" lIns="182827" tIns="146262" rIns="182827" bIns="146262" rtlCol="0">
-            <a:spAutoFit/>
-          </a:bodyPr>
-          <a:lstStyle/>
-          <a:p>
-            <a:pPr defTabSz="914072">
-              <a:lnSpc>
-                <a:spcPct val="90000"/>
-              </a:lnSpc>
-              <a:spcAft>
-                <a:spcPts val="600"/>
-              </a:spcAft>
-            </a:pPr>
-            <a:r>
-              <a:rPr lang="en-US" sz="1598" b="1" kern="0" dirty="0">
-                <a:latin typeface="Segoe UI"/>
-              </a:rPr>
-              <a:t> Id</a:t>
-            </a:r>
-          </a:p>
-        </p:txBody>
-      </p:sp>
-      <p:pic>
-        <p:nvPicPr>
-          <p:cNvPr id="45" name="Picture 44" descr="Key, Yellow, Metal, Symbol, Icon"/>
-          <p:cNvPicPr>
-            <a:picLocks noChangeAspect="1"/>
-          </p:cNvPicPr>
-          <p:nvPr/>
-        </p:nvPicPr>
-        <p:blipFill>
-          <a:blip r:embed="rId3"/>
-          <a:stretch>
-            <a:fillRect/>
-          </a:stretch>
-        </p:blipFill>
-        <p:spPr>
-          <a:xfrm rot="5400000">
-            <a:off x="770141" y="2272254"/>
-            <a:ext cx="281184" cy="140592"/>
-          </a:xfrm>
-          <a:prstGeom prst="rect">
-            <a:avLst/>
-          </a:prstGeom>
-        </p:spPr>
-      </p:pic>
-      <p:sp>
-        <p:nvSpPr>
-          <p:cNvPr id="32" name="TextBox 31"/>
-          <p:cNvSpPr txBox="1"/>
-          <p:nvPr/>
-        </p:nvSpPr>
-        <p:spPr>
-          <a:xfrm>
-            <a:off x="660524" y="2506943"/>
-            <a:ext cx="3047135" cy="2503036"/>
-          </a:xfrm>
-          <a:prstGeom prst="rect">
-            <a:avLst/>
-          </a:prstGeom>
-          <a:noFill/>
-          <a:ln w="28575">
-            <a:solidFill>
-              <a:schemeClr val="tx1"/>
-            </a:solidFill>
-          </a:ln>
-        </p:spPr>
-        <p:txBody>
-          <a:bodyPr wrap="square" lIns="182827" tIns="146262" rIns="182827" bIns="146262" rtlCol="0">
-            <a:spAutoFit/>
-          </a:bodyPr>
-          <a:lstStyle/>
-          <a:p>
-            <a:pPr defTabSz="914072">
-              <a:lnSpc>
-                <a:spcPct val="90000"/>
-              </a:lnSpc>
-              <a:spcAft>
-                <a:spcPts val="600"/>
-              </a:spcAft>
-            </a:pPr>
-            <a:r>
-              <a:rPr lang="en-US" sz="1801" b="1" kern="0" dirty="0">
-                <a:latin typeface="Segoe UI"/>
-              </a:rPr>
-              <a:t>Addresses</a:t>
-            </a:r>
-          </a:p>
-          <a:p>
-            <a:pPr defTabSz="914072">
-              <a:lnSpc>
-                <a:spcPct val="90000"/>
-              </a:lnSpc>
-              <a:spcAft>
-                <a:spcPts val="600"/>
-              </a:spcAft>
-            </a:pPr>
-            <a:endParaRPr lang="en-US" sz="1801" b="1" kern="0" dirty="0">
-              <a:latin typeface="Segoe UI"/>
-            </a:endParaRPr>
-          </a:p>
-          <a:p>
-            <a:pPr defTabSz="914072">
-              <a:lnSpc>
-                <a:spcPct val="90000"/>
-              </a:lnSpc>
-              <a:spcAft>
-                <a:spcPts val="600"/>
-              </a:spcAft>
-            </a:pPr>
-            <a:endParaRPr lang="en-US" sz="1801" b="1" kern="0" dirty="0">
-              <a:latin typeface="Segoe UI"/>
-            </a:endParaRPr>
-          </a:p>
-          <a:p>
-            <a:pPr defTabSz="914072">
-              <a:lnSpc>
-                <a:spcPct val="90000"/>
-              </a:lnSpc>
-              <a:spcAft>
-                <a:spcPts val="600"/>
-              </a:spcAft>
-            </a:pPr>
-            <a:endParaRPr lang="en-US" sz="1801" b="1" kern="0" dirty="0">
-              <a:latin typeface="Segoe UI"/>
-            </a:endParaRPr>
-          </a:p>
-          <a:p>
-            <a:pPr defTabSz="914072">
-              <a:lnSpc>
-                <a:spcPct val="90000"/>
-              </a:lnSpc>
-              <a:spcAft>
-                <a:spcPts val="600"/>
-              </a:spcAft>
-            </a:pPr>
-            <a:endParaRPr lang="en-US" sz="1801" b="1" kern="0" dirty="0">
-              <a:latin typeface="Segoe UI"/>
-            </a:endParaRPr>
-          </a:p>
-          <a:p>
-            <a:pPr defTabSz="914072">
-              <a:lnSpc>
-                <a:spcPct val="90000"/>
-              </a:lnSpc>
-              <a:spcAft>
-                <a:spcPts val="600"/>
-              </a:spcAft>
-            </a:pPr>
-            <a:endParaRPr lang="en-US" sz="1801" b="1" kern="0" dirty="0">
-              <a:latin typeface="Segoe UI"/>
-            </a:endParaRPr>
-          </a:p>
-          <a:p>
-            <a:pPr defTabSz="914072">
-              <a:lnSpc>
-                <a:spcPct val="90000"/>
-              </a:lnSpc>
-              <a:spcAft>
-                <a:spcPts val="600"/>
-              </a:spcAft>
-            </a:pPr>
-            <a:endParaRPr lang="en-US" sz="1801" b="1" kern="0" dirty="0">
-              <a:latin typeface="Segoe UI"/>
-            </a:endParaRPr>
-          </a:p>
-        </p:txBody>
-      </p:sp>
-      <p:sp>
-        <p:nvSpPr>
-          <p:cNvPr id="2" name="TextBox 1"/>
-          <p:cNvSpPr txBox="1"/>
-          <p:nvPr/>
-        </p:nvSpPr>
-        <p:spPr>
-          <a:xfrm>
-            <a:off x="3932888" y="1409386"/>
-            <a:ext cx="8550952" cy="5462949"/>
-          </a:xfrm>
-          <a:prstGeom prst="rect">
-            <a:avLst/>
-          </a:prstGeom>
-          <a:noFill/>
-        </p:spPr>
-        <p:txBody>
-          <a:bodyPr wrap="none" lIns="182827" tIns="146262" rIns="182827" bIns="146262" rtlCol="0">
-            <a:spAutoFit/>
-          </a:bodyPr>
-          <a:lstStyle/>
-          <a:p>
-            <a:pPr defTabSz="914072">
-              <a:lnSpc>
-                <a:spcPct val="90000"/>
-              </a:lnSpc>
-              <a:spcAft>
-                <a:spcPts val="600"/>
-              </a:spcAft>
-            </a:pPr>
-            <a:r>
-              <a:rPr lang="en-US" sz="2400" b="1" kern="0" dirty="0">
-                <a:latin typeface="Lucida Console" panose="020B0609040504020204" pitchFamily="49" charset="0"/>
-              </a:rPr>
-              <a:t>{</a:t>
-            </a:r>
-            <a:br>
-              <a:rPr lang="en-US" sz="2400" b="1" kern="0" dirty="0">
-                <a:latin typeface="Lucida Console" panose="020B0609040504020204" pitchFamily="49" charset="0"/>
-              </a:rPr>
-            </a:br>
-            <a:r>
-              <a:rPr lang="en-US" sz="2400" b="1" kern="0" dirty="0">
-                <a:latin typeface="Lucida Console" panose="020B0609040504020204" pitchFamily="49" charset="0"/>
-              </a:rPr>
-              <a:t>  "id": "0ec1ab0c-de08-4e42-a429-...",</a:t>
-            </a:r>
-          </a:p>
-          <a:p>
-            <a:pPr defTabSz="914072">
-              <a:lnSpc>
-                <a:spcPct val="90000"/>
-              </a:lnSpc>
-              <a:spcAft>
-                <a:spcPts val="600"/>
-              </a:spcAft>
-            </a:pPr>
-            <a:r>
-              <a:rPr lang="en-US" sz="2400" b="1" kern="0" dirty="0">
-                <a:latin typeface="Lucida Console" panose="020B0609040504020204" pitchFamily="49" charset="0"/>
-              </a:rPr>
-              <a:t>  "addresses": [</a:t>
-            </a:r>
-          </a:p>
-          <a:p>
-            <a:pPr defTabSz="914072">
-              <a:lnSpc>
-                <a:spcPct val="90000"/>
-              </a:lnSpc>
-              <a:spcAft>
-                <a:spcPts val="600"/>
-              </a:spcAft>
-            </a:pPr>
-            <a:r>
-              <a:rPr lang="en-US" sz="2400" b="1" kern="0" dirty="0">
-                <a:latin typeface="Lucida Console" panose="020B0609040504020204" pitchFamily="49" charset="0"/>
-              </a:rPr>
-              <a:t>    { "street": "1 Redmond Way",</a:t>
-            </a:r>
-          </a:p>
-          <a:p>
-            <a:pPr defTabSz="914072">
-              <a:lnSpc>
-                <a:spcPct val="90000"/>
-              </a:lnSpc>
-              <a:spcAft>
-                <a:spcPts val="600"/>
-              </a:spcAft>
-            </a:pPr>
-            <a:r>
-              <a:rPr lang="en-US" sz="2400" b="1" kern="0" dirty="0">
-                <a:latin typeface="Lucida Console" panose="020B0609040504020204" pitchFamily="49" charset="0"/>
-              </a:rPr>
-              <a:t>      "city": "Redmond", "state": "WA",</a:t>
-            </a:r>
-          </a:p>
-          <a:p>
-            <a:pPr defTabSz="914072">
-              <a:lnSpc>
-                <a:spcPct val="90000"/>
-              </a:lnSpc>
-              <a:spcAft>
-                <a:spcPts val="600"/>
-              </a:spcAft>
-            </a:pPr>
-            <a:r>
-              <a:rPr lang="en-US" sz="2400" b="1" kern="0" dirty="0">
-                <a:latin typeface="Lucida Console" panose="020B0609040504020204" pitchFamily="49" charset="0"/>
-              </a:rPr>
-              <a:t>      "zip": 98052}</a:t>
-            </a:r>
-          </a:p>
-          <a:p>
-            <a:pPr defTabSz="914072">
-              <a:lnSpc>
-                <a:spcPct val="90000"/>
-              </a:lnSpc>
-              <a:spcAft>
-                <a:spcPts val="600"/>
-              </a:spcAft>
-            </a:pPr>
-            <a:r>
-              <a:rPr lang="en-US" sz="2400" b="1" kern="0" dirty="0">
-                <a:latin typeface="Lucida Console" panose="020B0609040504020204" pitchFamily="49" charset="0"/>
-              </a:rPr>
-              <a:t>  ],</a:t>
-            </a:r>
-          </a:p>
-          <a:p>
-            <a:pPr defTabSz="914072">
-              <a:lnSpc>
-                <a:spcPct val="90000"/>
-              </a:lnSpc>
-              <a:spcAft>
-                <a:spcPts val="600"/>
-              </a:spcAft>
-            </a:pPr>
-            <a:r>
-              <a:rPr lang="en-US" sz="2400" b="1" kern="0" dirty="0">
-                <a:latin typeface="Lucida Console" panose="020B0609040504020204" pitchFamily="49" charset="0"/>
-              </a:rPr>
-              <a:t>  "</a:t>
-            </a:r>
-            <a:r>
-              <a:rPr lang="en-US" sz="2400" b="1" kern="0" dirty="0" err="1">
-                <a:latin typeface="Lucida Console" panose="020B0609040504020204" pitchFamily="49" charset="0"/>
-              </a:rPr>
-              <a:t>contactDetails</a:t>
-            </a:r>
-            <a:r>
-              <a:rPr lang="en-US" sz="2400" b="1" kern="0" dirty="0">
-                <a:latin typeface="Lucida Console" panose="020B0609040504020204" pitchFamily="49" charset="0"/>
-              </a:rPr>
-              <a:t>": [</a:t>
-            </a:r>
-          </a:p>
-          <a:p>
-            <a:pPr defTabSz="914072">
-              <a:lnSpc>
-                <a:spcPct val="90000"/>
-              </a:lnSpc>
-              <a:spcAft>
-                <a:spcPts val="600"/>
-              </a:spcAft>
-            </a:pPr>
-            <a:r>
-              <a:rPr lang="en-US" sz="2400" b="1" kern="0" dirty="0">
-                <a:latin typeface="Lucida Console" panose="020B0609040504020204" pitchFamily="49" charset="0"/>
-              </a:rPr>
-              <a:t>    {"type": "home", "detail": “555-1212"},</a:t>
-            </a:r>
-          </a:p>
-          <a:p>
-            <a:pPr defTabSz="914072">
-              <a:lnSpc>
-                <a:spcPct val="90000"/>
-              </a:lnSpc>
-              <a:spcAft>
-                <a:spcPts val="600"/>
-              </a:spcAft>
-            </a:pPr>
-            <a:r>
-              <a:rPr lang="en-US" sz="2400" b="1" kern="0" dirty="0">
-                <a:latin typeface="Lucida Console" panose="020B0609040504020204" pitchFamily="49" charset="0"/>
-              </a:rPr>
-              <a:t>    {"type": "email", "detail": “me@ms.com"}</a:t>
-            </a:r>
-          </a:p>
-          <a:p>
-            <a:pPr defTabSz="914072">
-              <a:lnSpc>
-                <a:spcPct val="90000"/>
-              </a:lnSpc>
-              <a:spcAft>
-                <a:spcPts val="600"/>
-              </a:spcAft>
-            </a:pPr>
-            <a:r>
-              <a:rPr lang="en-US" sz="2400" b="1" kern="0" dirty="0">
-                <a:latin typeface="Lucida Console" panose="020B0609040504020204" pitchFamily="49" charset="0"/>
-              </a:rPr>
-              <a:t>  ],</a:t>
-            </a:r>
-          </a:p>
-          <a:p>
-            <a:pPr defTabSz="914072">
-              <a:lnSpc>
-                <a:spcPct val="90000"/>
-              </a:lnSpc>
-              <a:spcAft>
-                <a:spcPts val="600"/>
-              </a:spcAft>
-            </a:pPr>
-            <a:r>
-              <a:rPr lang="en-US" sz="2400" b="1" kern="0" dirty="0">
-                <a:latin typeface="Lucida Console" panose="020B0609040504020204" pitchFamily="49" charset="0"/>
-              </a:rPr>
-              <a:t>    ...</a:t>
-            </a:r>
-          </a:p>
-          <a:p>
-            <a:pPr defTabSz="914072">
-              <a:lnSpc>
-                <a:spcPct val="90000"/>
-              </a:lnSpc>
-              <a:spcAft>
-                <a:spcPts val="600"/>
-              </a:spcAft>
-            </a:pPr>
-            <a:r>
-              <a:rPr lang="en-US" sz="2400" b="1" kern="0" dirty="0">
-                <a:latin typeface="Lucida Console" panose="020B0609040504020204" pitchFamily="49" charset="0"/>
-              </a:rPr>
-              <a:t>}</a:t>
-            </a:r>
-          </a:p>
-        </p:txBody>
-      </p:sp>
-      <p:sp>
-        <p:nvSpPr>
-          <p:cNvPr id="51" name="TextBox 50"/>
-          <p:cNvSpPr txBox="1"/>
-          <p:nvPr/>
-        </p:nvSpPr>
-        <p:spPr>
-          <a:xfrm>
-            <a:off x="838047" y="3007393"/>
-            <a:ext cx="2790124" cy="871179"/>
-          </a:xfrm>
-          <a:prstGeom prst="rect">
-            <a:avLst/>
-          </a:prstGeom>
-          <a:noFill/>
-          <a:ln w="28575">
-            <a:solidFill>
-              <a:schemeClr val="tx1"/>
-            </a:solidFill>
-          </a:ln>
-        </p:spPr>
-        <p:txBody>
-          <a:bodyPr wrap="square" lIns="182827" tIns="146262" rIns="182827" bIns="146262" rtlCol="0">
-            <a:spAutoFit/>
-          </a:bodyPr>
-          <a:lstStyle/>
-          <a:p>
-            <a:pPr defTabSz="914072">
-              <a:lnSpc>
-                <a:spcPct val="90000"/>
-              </a:lnSpc>
-              <a:spcAft>
-                <a:spcPts val="600"/>
-              </a:spcAft>
-            </a:pPr>
-            <a:r>
-              <a:rPr lang="en-US" sz="1801" b="1" kern="0" dirty="0">
-                <a:latin typeface="Segoe UI"/>
-              </a:rPr>
-              <a:t>Address</a:t>
-            </a:r>
-          </a:p>
-          <a:p>
-            <a:pPr defTabSz="914072">
-              <a:lnSpc>
-                <a:spcPct val="90000"/>
-              </a:lnSpc>
-              <a:spcAft>
-                <a:spcPts val="600"/>
-              </a:spcAft>
-            </a:pPr>
-            <a:r>
-              <a:rPr lang="en-US" sz="1801" b="1" kern="0" dirty="0">
-                <a:latin typeface="Segoe UI"/>
-              </a:rPr>
-              <a:t>…</a:t>
-            </a:r>
-          </a:p>
-        </p:txBody>
-      </p:sp>
-      <p:sp>
-        <p:nvSpPr>
-          <p:cNvPr id="52" name="TextBox 51"/>
-          <p:cNvSpPr txBox="1"/>
-          <p:nvPr/>
-        </p:nvSpPr>
-        <p:spPr>
-          <a:xfrm>
-            <a:off x="838047" y="3878155"/>
-            <a:ext cx="2790124" cy="871179"/>
-          </a:xfrm>
-          <a:prstGeom prst="rect">
-            <a:avLst/>
-          </a:prstGeom>
-          <a:noFill/>
-          <a:ln w="28575">
-            <a:solidFill>
-              <a:schemeClr val="tx1"/>
-            </a:solidFill>
-          </a:ln>
-        </p:spPr>
-        <p:txBody>
-          <a:bodyPr wrap="square" lIns="182827" tIns="146262" rIns="182827" bIns="146262" rtlCol="0">
-            <a:spAutoFit/>
-          </a:bodyPr>
-          <a:lstStyle/>
-          <a:p>
-            <a:pPr defTabSz="914072">
-              <a:lnSpc>
-                <a:spcPct val="90000"/>
-              </a:lnSpc>
-              <a:spcAft>
-                <a:spcPts val="600"/>
-              </a:spcAft>
-            </a:pPr>
-            <a:r>
-              <a:rPr lang="en-US" sz="1801" b="1" kern="0" dirty="0">
-                <a:latin typeface="Segoe UI"/>
-              </a:rPr>
-              <a:t>Address</a:t>
-            </a:r>
-          </a:p>
-          <a:p>
-            <a:pPr defTabSz="914072">
-              <a:lnSpc>
-                <a:spcPct val="90000"/>
-              </a:lnSpc>
-              <a:spcAft>
-                <a:spcPts val="600"/>
-              </a:spcAft>
-            </a:pPr>
-            <a:r>
-              <a:rPr lang="en-US" sz="1801" b="1" kern="0" dirty="0">
-                <a:latin typeface="Segoe UI"/>
-              </a:rPr>
-              <a:t>…</a:t>
-            </a:r>
-          </a:p>
-        </p:txBody>
-      </p:sp>
-      <p:sp>
-        <p:nvSpPr>
-          <p:cNvPr id="54" name="TextBox 53"/>
-          <p:cNvSpPr txBox="1"/>
-          <p:nvPr/>
-        </p:nvSpPr>
-        <p:spPr>
-          <a:xfrm>
-            <a:off x="657216" y="4995914"/>
-            <a:ext cx="3047135" cy="1523922"/>
-          </a:xfrm>
-          <a:prstGeom prst="rect">
-            <a:avLst/>
-          </a:prstGeom>
-          <a:noFill/>
-          <a:ln w="28575">
-            <a:solidFill>
-              <a:schemeClr val="tx1"/>
-            </a:solidFill>
-          </a:ln>
-        </p:spPr>
-        <p:txBody>
-          <a:bodyPr wrap="square" lIns="182827" tIns="146262" rIns="182827" bIns="146262" rtlCol="0">
-            <a:spAutoFit/>
-          </a:bodyPr>
-          <a:lstStyle/>
-          <a:p>
-            <a:pPr defTabSz="914072">
-              <a:lnSpc>
-                <a:spcPct val="90000"/>
-              </a:lnSpc>
-              <a:spcAft>
-                <a:spcPts val="600"/>
-              </a:spcAft>
-            </a:pPr>
-            <a:r>
-              <a:rPr lang="en-US" sz="1801" b="1" kern="0" dirty="0" err="1">
-                <a:latin typeface="Segoe UI"/>
-              </a:rPr>
-              <a:t>ContactDetails</a:t>
-            </a:r>
-            <a:endParaRPr lang="en-US" sz="1801" b="1" kern="0" dirty="0">
-              <a:latin typeface="Segoe UI"/>
-            </a:endParaRPr>
-          </a:p>
-          <a:p>
-            <a:pPr defTabSz="914072">
-              <a:lnSpc>
-                <a:spcPct val="90000"/>
-              </a:lnSpc>
-              <a:spcAft>
-                <a:spcPts val="600"/>
-              </a:spcAft>
-            </a:pPr>
-            <a:endParaRPr lang="en-US" sz="1801" b="1" kern="0" dirty="0">
-              <a:latin typeface="Segoe UI"/>
-            </a:endParaRPr>
-          </a:p>
-          <a:p>
-            <a:pPr defTabSz="914072">
-              <a:lnSpc>
-                <a:spcPct val="90000"/>
-              </a:lnSpc>
-              <a:spcAft>
-                <a:spcPts val="600"/>
-              </a:spcAft>
-            </a:pPr>
-            <a:endParaRPr lang="en-US" sz="1801" b="1" kern="0" dirty="0">
-              <a:latin typeface="Segoe UI"/>
-            </a:endParaRPr>
-          </a:p>
-          <a:p>
-            <a:pPr defTabSz="914072">
-              <a:lnSpc>
-                <a:spcPct val="90000"/>
-              </a:lnSpc>
-              <a:spcAft>
-                <a:spcPts val="600"/>
-              </a:spcAft>
-            </a:pPr>
-            <a:endParaRPr lang="en-US" sz="1801" b="1" kern="0" dirty="0">
-              <a:latin typeface="Segoe UI"/>
-            </a:endParaRPr>
-          </a:p>
-        </p:txBody>
-      </p:sp>
-      <p:sp>
-        <p:nvSpPr>
-          <p:cNvPr id="55" name="TextBox 54"/>
-          <p:cNvSpPr txBox="1"/>
-          <p:nvPr/>
-        </p:nvSpPr>
-        <p:spPr>
-          <a:xfrm>
-            <a:off x="819258" y="5474674"/>
-            <a:ext cx="2790124" cy="871179"/>
-          </a:xfrm>
-          <a:prstGeom prst="rect">
-            <a:avLst/>
-          </a:prstGeom>
-          <a:noFill/>
-          <a:ln w="28575">
-            <a:solidFill>
-              <a:schemeClr val="tx1"/>
-            </a:solidFill>
-          </a:ln>
-        </p:spPr>
-        <p:txBody>
-          <a:bodyPr wrap="square" lIns="182827" tIns="146262" rIns="182827" bIns="146262" rtlCol="0">
-            <a:spAutoFit/>
-          </a:bodyPr>
-          <a:lstStyle/>
-          <a:p>
-            <a:pPr defTabSz="914072">
-              <a:lnSpc>
-                <a:spcPct val="90000"/>
-              </a:lnSpc>
-              <a:spcAft>
-                <a:spcPts val="600"/>
-              </a:spcAft>
-            </a:pPr>
-            <a:r>
-              <a:rPr lang="en-US" sz="1801" b="1" kern="0" dirty="0" err="1">
-                <a:latin typeface="Segoe UI"/>
-              </a:rPr>
-              <a:t>ContactDetail</a:t>
-            </a:r>
-            <a:endParaRPr lang="en-US" sz="1801" b="1" kern="0" dirty="0">
-              <a:latin typeface="Segoe UI"/>
-            </a:endParaRPr>
-          </a:p>
-          <a:p>
-            <a:pPr defTabSz="914072">
-              <a:lnSpc>
-                <a:spcPct val="90000"/>
-              </a:lnSpc>
-              <a:spcAft>
-                <a:spcPts val="600"/>
-              </a:spcAft>
-            </a:pPr>
-            <a:r>
-              <a:rPr lang="en-US" sz="1801" b="1" kern="0" dirty="0">
-                <a:latin typeface="Segoe UI"/>
-              </a:rPr>
-              <a:t>…</a:t>
-            </a:r>
-          </a:p>
-        </p:txBody>
-      </p:sp>
-      <p:sp>
-        <p:nvSpPr>
-          <p:cNvPr id="5" name="Title 4"/>
-          <p:cNvSpPr>
-            <a:spLocks noGrp="1"/>
-          </p:cNvSpPr>
-          <p:nvPr>
-            <p:ph type="title"/>
-          </p:nvPr>
-        </p:nvSpPr>
-        <p:spPr/>
-        <p:txBody>
-          <a:bodyPr/>
-          <a:lstStyle/>
-          <a:p>
-            <a:r>
-              <a:rPr lang="en-US" dirty="0">
-                <a:solidFill>
-                  <a:schemeClr val="tx1"/>
-                </a:solidFill>
-              </a:rPr>
-              <a:t>Modeling Data: The Document Way</a:t>
-            </a:r>
-          </a:p>
-        </p:txBody>
-      </p:sp>
-    </p:spTree>
-    <p:extLst>
-      <p:ext uri="{BB962C8B-B14F-4D97-AF65-F5344CB8AC3E}">
-        <p14:creationId xmlns:p14="http://schemas.microsoft.com/office/powerpoint/2010/main" val="4067914718"/>
-      </p:ext>
-    </p:extLst>
-  </p:cSld>
-  <p:clrMapOvr>
-    <a:masterClrMapping/>
-  </p:clrMapOvr>
 </p:sld>
 </file>
 
@@ -30190,9 +30322,12 @@
 </file>
 
 <file path=customXml/item1.xml><?xml version="1.0" encoding="utf-8"?>
-<p:properties xmlns:p="http://schemas.microsoft.com/office/2006/metadata/properties" xmlns:xsi="http://www.w3.org/2001/XMLSchema-instance" xmlns:pc="http://schemas.microsoft.com/office/infopath/2007/PartnerControls">
-  <documentManagement/>
-</p:properties>
+<?mso-contentType ?>
+<FormTemplates xmlns="http://schemas.microsoft.com/sharepoint/v3/contenttype/forms">
+  <Display>DocumentLibraryForm</Display>
+  <Edit>DocumentLibraryForm</Edit>
+  <New>DocumentLibraryForm</New>
+</FormTemplates>
 </file>
 
 <file path=customXml/item2.xml><?xml version="1.0" encoding="utf-8"?>
@@ -30350,26 +30485,15 @@
 </file>
 
 <file path=customXml/item3.xml><?xml version="1.0" encoding="utf-8"?>
-<?mso-contentType ?>
-<FormTemplates xmlns="http://schemas.microsoft.com/sharepoint/v3/contenttype/forms">
-  <Display>DocumentLibraryForm</Display>
-  <Edit>DocumentLibraryForm</Edit>
-  <New>DocumentLibraryForm</New>
-</FormTemplates>
+<p:properties xmlns:p="http://schemas.microsoft.com/office/2006/metadata/properties" xmlns:xsi="http://www.w3.org/2001/XMLSchema-instance" xmlns:pc="http://schemas.microsoft.com/office/infopath/2007/PartnerControls">
+  <documentManagement/>
+</p:properties>
 </file>
 
 <file path=customXml/itemProps1.xml><?xml version="1.0" encoding="utf-8"?>
-<ds:datastoreItem xmlns:ds="http://schemas.openxmlformats.org/officeDocument/2006/customXml" ds:itemID="{F990F116-B58F-4255-B05B-DA3808E0E5C6}">
+<ds:datastoreItem xmlns:ds="http://schemas.openxmlformats.org/officeDocument/2006/customXml" ds:itemID="{758FDAC0-319D-4A54-8D8E-1D42CB1F8004}">
   <ds:schemaRefs>
-    <ds:schemaRef ds:uri="http://purl.org/dc/elements/1.1/"/>
-    <ds:schemaRef ds:uri="http://schemas.microsoft.com/office/2006/documentManagement/types"/>
-    <ds:schemaRef ds:uri="http://schemas.microsoft.com/office/infopath/2007/PartnerControls"/>
-    <ds:schemaRef ds:uri="http://purl.org/dc/dcmitype/"/>
-    <ds:schemaRef ds:uri="http://www.w3.org/XML/1998/namespace"/>
-    <ds:schemaRef ds:uri="http://schemas.microsoft.com/office/2006/metadata/properties"/>
-    <ds:schemaRef ds:uri="http://schemas.openxmlformats.org/package/2006/metadata/core-properties"/>
-    <ds:schemaRef ds:uri="630a2e83-186a-4a0f-ab27-bee8a8096abc"/>
-    <ds:schemaRef ds:uri="http://purl.org/dc/terms/"/>
+    <ds:schemaRef ds:uri="http://schemas.microsoft.com/sharepoint/v3/contenttype/forms"/>
   </ds:schemaRefs>
 </ds:datastoreItem>
 </file>
@@ -30393,9 +30517,17 @@
 </file>
 
 <file path=customXml/itemProps3.xml><?xml version="1.0" encoding="utf-8"?>
-<ds:datastoreItem xmlns:ds="http://schemas.openxmlformats.org/officeDocument/2006/customXml" ds:itemID="{758FDAC0-319D-4A54-8D8E-1D42CB1F8004}">
+<ds:datastoreItem xmlns:ds="http://schemas.openxmlformats.org/officeDocument/2006/customXml" ds:itemID="{F990F116-B58F-4255-B05B-DA3808E0E5C6}">
   <ds:schemaRefs>
-    <ds:schemaRef ds:uri="http://schemas.microsoft.com/sharepoint/v3/contenttype/forms"/>
+    <ds:schemaRef ds:uri="http://purl.org/dc/elements/1.1/"/>
+    <ds:schemaRef ds:uri="http://schemas.microsoft.com/office/2006/documentManagement/types"/>
+    <ds:schemaRef ds:uri="http://schemas.microsoft.com/office/infopath/2007/PartnerControls"/>
+    <ds:schemaRef ds:uri="http://purl.org/dc/dcmitype/"/>
+    <ds:schemaRef ds:uri="http://www.w3.org/XML/1998/namespace"/>
+    <ds:schemaRef ds:uri="http://schemas.microsoft.com/office/2006/metadata/properties"/>
+    <ds:schemaRef ds:uri="http://schemas.openxmlformats.org/package/2006/metadata/core-properties"/>
+    <ds:schemaRef ds:uri="630a2e83-186a-4a0f-ab27-bee8a8096abc"/>
+    <ds:schemaRef ds:uri="http://purl.org/dc/terms/"/>
   </ds:schemaRefs>
 </ds:datastoreItem>
 </file>
</xml_diff>